<commit_message>
Generation of new data set, scale factor analysis
Fixed curve fit for finding characteristic variable by adding parameter bounds

Scale factor still not great
</commit_message>
<xml_diff>
--- a/documents/AY 23-24 1st Sem Progress Report.pptx
+++ b/documents/AY 23-24 1st Sem Progress Report.pptx
@@ -10,7 +10,7 @@
   <p:sldIdLst>
     <p:sldId id="256" r:id="rId2"/>
     <p:sldId id="257" r:id="rId3"/>
-    <p:sldId id="260" r:id="rId4"/>
+    <p:sldId id="265" r:id="rId4"/>
     <p:sldId id="258" r:id="rId5"/>
     <p:sldId id="261" r:id="rId6"/>
     <p:sldId id="259" r:id="rId7"/>
@@ -118,12 +118,53 @@
 </p:presentation>
 </file>
 
+<file path=ppt/authors.xml><?xml version="1.0" encoding="utf-8"?>
+<p188:authorLst xmlns:a="http://schemas.openxmlformats.org/drawingml/2006/main" xmlns:r="http://schemas.openxmlformats.org/officeDocument/2006/relationships" xmlns:p188="http://schemas.microsoft.com/office/powerpoint/2018/8/main">
+  <p188:author id="{57548B66-4D59-985D-85D3-65079295D56B}" name="Clarence Ioakim Sy" initials="CS" userId="S::ctsy@outlook.up.edu.ph::093305ad-f10f-46d1-89a1-774fe872a2de" providerId="AD"/>
+</p188:authorLst>
+</file>
+
+<file path=ppt/comments/modernComment_105_A49E1FD1.xml><?xml version="1.0" encoding="utf-8"?>
+<p188:cmLst xmlns:a="http://schemas.openxmlformats.org/drawingml/2006/main" xmlns:r="http://schemas.openxmlformats.org/officeDocument/2006/relationships" xmlns:p188="http://schemas.microsoft.com/office/powerpoint/2018/8/main">
+  <p188:cm id="{99AC6837-1D39-487C-B461-D57E3E38E9D0}" authorId="{57548B66-4D59-985D-85D3-65079295D56B}" created="2023-12-13T08:53:28.927">
+    <pc:sldMkLst xmlns:pc="http://schemas.microsoft.com/office/powerpoint/2013/main/command">
+      <pc:docMk/>
+      <pc:sldMk cId="2761826257" sldId="261"/>
+    </pc:sldMkLst>
+    <p188:replyLst>
+      <p188:reply id="{BFE1A062-6F1A-460E-8431-92BF09C37505}" authorId="{57548B66-4D59-985D-85D3-65079295D56B}" created="2023-12-13T08:53:45.368">
+        <p188:txBody>
+          <a:bodyPr/>
+          <a:lstStyle/>
+          <a:p>
+            <a:r>
+              <a:rPr lang="en-PH"/>
+              <a:t>Explain what the variables are</a:t>
+            </a:r>
+          </a:p>
+        </p188:txBody>
+      </p188:reply>
+    </p188:replyLst>
+    <p188:txBody>
+      <a:bodyPr/>
+      <a:lstStyle/>
+      <a:p>
+        <a:r>
+          <a:rPr lang="en-PH"/>
+          <a:t>Get class -&gt; highlight neighborhood -&gt; lambda grid</a:t>
+        </a:r>
+      </a:p>
+    </p188:txBody>
+  </p188:cm>
+</p188:cmLst>
+</file>
+
 <file path=ppt/diagrams/colors1.xml><?xml version="1.0" encoding="utf-8"?>
-<dgm:colorsDef xmlns:dgm="http://schemas.openxmlformats.org/drawingml/2006/diagram" xmlns:a="http://schemas.openxmlformats.org/drawingml/2006/main" uniqueId="urn:microsoft.com/office/officeart/2005/8/colors/accent1_2">
+<dgm:colorsDef xmlns:dgm="http://schemas.openxmlformats.org/drawingml/2006/diagram" xmlns:a="http://schemas.openxmlformats.org/drawingml/2006/main" uniqueId="urn:microsoft.com/office/officeart/2005/8/colors/colorful2">
   <dgm:title val=""/>
   <dgm:desc val=""/>
   <dgm:catLst>
-    <dgm:cat type="accent1" pri="11200"/>
+    <dgm:cat type="colorful" pri="10200"/>
   </dgm:catLst>
   <dgm:styleLbl name="node0">
     <dgm:fillClrLst meth="repeat">
@@ -137,21 +178,10 @@
     <dgm:txFillClrLst/>
     <dgm:txEffectClrLst/>
   </dgm:styleLbl>
-  <dgm:styleLbl name="alignNode1">
-    <dgm:fillClrLst meth="repeat">
-      <a:schemeClr val="accent1"/>
-    </dgm:fillClrLst>
-    <dgm:linClrLst meth="repeat">
-      <a:schemeClr val="accent1"/>
-    </dgm:linClrLst>
-    <dgm:effectClrLst/>
-    <dgm:txLinClrLst/>
-    <dgm:txFillClrLst/>
-    <dgm:txEffectClrLst/>
-  </dgm:styleLbl>
   <dgm:styleLbl name="node1">
-    <dgm:fillClrLst meth="repeat">
-      <a:schemeClr val="accent1"/>
+    <dgm:fillClrLst>
+      <a:schemeClr val="accent2"/>
+      <a:schemeClr val="accent3"/>
     </dgm:fillClrLst>
     <dgm:linClrLst meth="repeat">
       <a:schemeClr val="lt1"/>
@@ -161,9 +191,24 @@
     <dgm:txFillClrLst/>
     <dgm:txEffectClrLst/>
   </dgm:styleLbl>
+  <dgm:styleLbl name="alignNode1">
+    <dgm:fillClrLst>
+      <a:schemeClr val="accent2"/>
+      <a:schemeClr val="accent3"/>
+    </dgm:fillClrLst>
+    <dgm:linClrLst>
+      <a:schemeClr val="accent2"/>
+      <a:schemeClr val="accent3"/>
+    </dgm:linClrLst>
+    <dgm:effectClrLst/>
+    <dgm:txLinClrLst/>
+    <dgm:txFillClrLst/>
+    <dgm:txEffectClrLst/>
+  </dgm:styleLbl>
   <dgm:styleLbl name="lnNode1">
-    <dgm:fillClrLst meth="repeat">
-      <a:schemeClr val="accent1"/>
+    <dgm:fillClrLst>
+      <a:schemeClr val="accent2"/>
+      <a:schemeClr val="accent3"/>
     </dgm:fillClrLst>
     <dgm:linClrLst meth="repeat">
       <a:schemeClr val="lt1"/>
@@ -174,8 +219,11 @@
     <dgm:txEffectClrLst/>
   </dgm:styleLbl>
   <dgm:styleLbl name="vennNode1">
-    <dgm:fillClrLst meth="repeat">
-      <a:schemeClr val="accent1">
+    <dgm:fillClrLst>
+      <a:schemeClr val="accent2">
+        <a:alpha val="50000"/>
+      </a:schemeClr>
+      <a:schemeClr val="accent3">
         <a:alpha val="50000"/>
       </a:schemeClr>
     </dgm:fillClrLst>
@@ -188,8 +236,8 @@
     <dgm:txEffectClrLst/>
   </dgm:styleLbl>
   <dgm:styleLbl name="node2">
-    <dgm:fillClrLst meth="repeat">
-      <a:schemeClr val="accent1"/>
+    <dgm:fillClrLst>
+      <a:schemeClr val="accent3"/>
     </dgm:fillClrLst>
     <dgm:linClrLst meth="repeat">
       <a:schemeClr val="lt1"/>
@@ -200,8 +248,8 @@
     <dgm:txEffectClrLst/>
   </dgm:styleLbl>
   <dgm:styleLbl name="node3">
-    <dgm:fillClrLst meth="repeat">
-      <a:schemeClr val="accent1"/>
+    <dgm:fillClrLst>
+      <a:schemeClr val="accent4"/>
     </dgm:fillClrLst>
     <dgm:linClrLst meth="repeat">
       <a:schemeClr val="lt1"/>
@@ -212,8 +260,8 @@
     <dgm:txEffectClrLst/>
   </dgm:styleLbl>
   <dgm:styleLbl name="node4">
-    <dgm:fillClrLst meth="repeat">
-      <a:schemeClr val="accent1"/>
+    <dgm:fillClrLst>
+      <a:schemeClr val="accent5"/>
     </dgm:fillClrLst>
     <dgm:linClrLst meth="repeat">
       <a:schemeClr val="lt1"/>
@@ -224,8 +272,11 @@
     <dgm:txEffectClrLst/>
   </dgm:styleLbl>
   <dgm:styleLbl name="fgImgPlace1">
-    <dgm:fillClrLst meth="repeat">
-      <a:schemeClr val="accent1">
+    <dgm:fillClrLst>
+      <a:schemeClr val="accent2">
+        <a:tint val="50000"/>
+      </a:schemeClr>
+      <a:schemeClr val="accent3">
         <a:tint val="50000"/>
       </a:schemeClr>
     </dgm:fillClrLst>
@@ -240,9 +291,12 @@
     <dgm:txEffectClrLst/>
   </dgm:styleLbl>
   <dgm:styleLbl name="alignImgPlace1">
-    <dgm:fillClrLst meth="repeat">
-      <a:schemeClr val="accent1">
+    <dgm:fillClrLst>
+      <a:schemeClr val="accent2">
         <a:tint val="50000"/>
+      </a:schemeClr>
+      <a:schemeClr val="accent3">
+        <a:tint val="20000"/>
       </a:schemeClr>
     </dgm:fillClrLst>
     <dgm:linClrLst meth="repeat">
@@ -256,9 +310,12 @@
     <dgm:txEffectClrLst/>
   </dgm:styleLbl>
   <dgm:styleLbl name="bgImgPlace1">
-    <dgm:fillClrLst meth="repeat">
-      <a:schemeClr val="accent1">
+    <dgm:fillClrLst>
+      <a:schemeClr val="accent2">
         <a:tint val="50000"/>
+      </a:schemeClr>
+      <a:schemeClr val="accent3">
+        <a:tint val="20000"/>
       </a:schemeClr>
     </dgm:fillClrLst>
     <dgm:linClrLst meth="repeat">
@@ -272,15 +329,12 @@
     <dgm:txEffectClrLst/>
   </dgm:styleLbl>
   <dgm:styleLbl name="sibTrans2D1">
-    <dgm:fillClrLst meth="repeat">
-      <a:schemeClr val="accent1">
-        <a:tint val="60000"/>
-      </a:schemeClr>
+    <dgm:fillClrLst>
+      <a:schemeClr val="accent2"/>
+      <a:schemeClr val="accent3"/>
     </dgm:fillClrLst>
     <dgm:linClrLst meth="repeat">
-      <a:schemeClr val="accent1">
-        <a:tint val="60000"/>
-      </a:schemeClr>
+      <a:schemeClr val="lt1"/>
     </dgm:linClrLst>
     <dgm:effectClrLst/>
     <dgm:txLinClrLst/>
@@ -288,43 +342,40 @@
     <dgm:txEffectClrLst/>
   </dgm:styleLbl>
   <dgm:styleLbl name="fgSibTrans2D1">
-    <dgm:fillClrLst meth="repeat">
-      <a:schemeClr val="accent1">
-        <a:tint val="60000"/>
-      </a:schemeClr>
+    <dgm:fillClrLst>
+      <a:schemeClr val="accent2"/>
+      <a:schemeClr val="accent3"/>
     </dgm:fillClrLst>
     <dgm:linClrLst meth="repeat">
-      <a:schemeClr val="accent1">
-        <a:tint val="60000"/>
-      </a:schemeClr>
+      <a:schemeClr val="lt1"/>
     </dgm:linClrLst>
     <dgm:effectClrLst/>
     <dgm:txLinClrLst/>
-    <dgm:txFillClrLst/>
+    <dgm:txFillClrLst meth="repeat">
+      <a:schemeClr val="lt1"/>
+    </dgm:txFillClrLst>
     <dgm:txEffectClrLst/>
   </dgm:styleLbl>
   <dgm:styleLbl name="bgSibTrans2D1">
-    <dgm:fillClrLst meth="repeat">
-      <a:schemeClr val="accent1">
-        <a:tint val="60000"/>
-      </a:schemeClr>
+    <dgm:fillClrLst>
+      <a:schemeClr val="accent2"/>
+      <a:schemeClr val="accent3"/>
     </dgm:fillClrLst>
     <dgm:linClrLst meth="repeat">
-      <a:schemeClr val="accent1">
-        <a:tint val="60000"/>
-      </a:schemeClr>
+      <a:schemeClr val="lt1"/>
     </dgm:linClrLst>
     <dgm:effectClrLst/>
     <dgm:txLinClrLst/>
-    <dgm:txFillClrLst/>
+    <dgm:txFillClrLst meth="repeat">
+      <a:schemeClr val="lt1"/>
+    </dgm:txFillClrLst>
     <dgm:txEffectClrLst/>
   </dgm:styleLbl>
   <dgm:styleLbl name="sibTrans1D1">
-    <dgm:fillClrLst meth="repeat">
-      <a:schemeClr val="accent1"/>
-    </dgm:fillClrLst>
-    <dgm:linClrLst meth="repeat">
-      <a:schemeClr val="accent1"/>
+    <dgm:fillClrLst/>
+    <dgm:linClrLst>
+      <a:schemeClr val="accent2"/>
+      <a:schemeClr val="accent3"/>
     </dgm:linClrLst>
     <dgm:effectClrLst/>
     <dgm:txLinClrLst/>
@@ -335,10 +386,10 @@
   </dgm:styleLbl>
   <dgm:styleLbl name="callout">
     <dgm:fillClrLst meth="repeat">
-      <a:schemeClr val="accent1"/>
+      <a:schemeClr val="accent2"/>
     </dgm:fillClrLst>
     <dgm:linClrLst meth="repeat">
-      <a:schemeClr val="accent1">
+      <a:schemeClr val="accent2">
         <a:tint val="50000"/>
       </a:schemeClr>
     </dgm:linClrLst>
@@ -351,10 +402,12 @@
   </dgm:styleLbl>
   <dgm:styleLbl name="asst0">
     <dgm:fillClrLst meth="repeat">
-      <a:schemeClr val="accent1"/>
+      <a:schemeClr val="accent2"/>
     </dgm:fillClrLst>
     <dgm:linClrLst meth="repeat">
-      <a:schemeClr val="lt1"/>
+      <a:schemeClr val="lt1">
+        <a:shade val="80000"/>
+      </a:schemeClr>
     </dgm:linClrLst>
     <dgm:effectClrLst/>
     <dgm:txLinClrLst/>
@@ -363,10 +416,12 @@
   </dgm:styleLbl>
   <dgm:styleLbl name="asst1">
     <dgm:fillClrLst meth="repeat">
-      <a:schemeClr val="accent1"/>
+      <a:schemeClr val="accent3"/>
     </dgm:fillClrLst>
     <dgm:linClrLst meth="repeat">
-      <a:schemeClr val="lt1"/>
+      <a:schemeClr val="lt1">
+        <a:shade val="80000"/>
+      </a:schemeClr>
     </dgm:linClrLst>
     <dgm:effectClrLst/>
     <dgm:txLinClrLst/>
@@ -374,8 +429,8 @@
     <dgm:txEffectClrLst/>
   </dgm:styleLbl>
   <dgm:styleLbl name="asst2">
-    <dgm:fillClrLst meth="repeat">
-      <a:schemeClr val="accent1"/>
+    <dgm:fillClrLst>
+      <a:schemeClr val="accent4"/>
     </dgm:fillClrLst>
     <dgm:linClrLst meth="repeat">
       <a:schemeClr val="lt1"/>
@@ -386,8 +441,8 @@
     <dgm:txEffectClrLst/>
   </dgm:styleLbl>
   <dgm:styleLbl name="asst3">
-    <dgm:fillClrLst meth="repeat">
-      <a:schemeClr val="accent1"/>
+    <dgm:fillClrLst>
+      <a:schemeClr val="accent5"/>
     </dgm:fillClrLst>
     <dgm:linClrLst meth="repeat">
       <a:schemeClr val="lt1"/>
@@ -398,8 +453,8 @@
     <dgm:txEffectClrLst/>
   </dgm:styleLbl>
   <dgm:styleLbl name="asst4">
-    <dgm:fillClrLst meth="repeat">
-      <a:schemeClr val="accent1"/>
+    <dgm:fillClrLst>
+      <a:schemeClr val="accent6"/>
     </dgm:fillClrLst>
     <dgm:linClrLst meth="repeat">
       <a:schemeClr val="lt1"/>
@@ -411,14 +466,10 @@
   </dgm:styleLbl>
   <dgm:styleLbl name="parChTrans2D1">
     <dgm:fillClrLst meth="repeat">
-      <a:schemeClr val="accent1">
-        <a:tint val="60000"/>
-      </a:schemeClr>
+      <a:schemeClr val="accent2"/>
     </dgm:fillClrLst>
     <dgm:linClrLst meth="repeat">
-      <a:schemeClr val="accent1">
-        <a:tint val="60000"/>
-      </a:schemeClr>
+      <a:schemeClr val="lt1"/>
     </dgm:linClrLst>
     <dgm:effectClrLst/>
     <dgm:txLinClrLst/>
@@ -429,38 +480,34 @@
   </dgm:styleLbl>
   <dgm:styleLbl name="parChTrans2D2">
     <dgm:fillClrLst meth="repeat">
-      <a:schemeClr val="accent1"/>
+      <a:schemeClr val="accent3"/>
     </dgm:fillClrLst>
     <dgm:linClrLst meth="repeat">
-      <a:schemeClr val="accent1"/>
+      <a:schemeClr val="lt1"/>
     </dgm:linClrLst>
     <dgm:effectClrLst/>
     <dgm:txLinClrLst/>
-    <dgm:txFillClrLst meth="repeat">
-      <a:schemeClr val="lt1"/>
-    </dgm:txFillClrLst>
+    <dgm:txFillClrLst/>
     <dgm:txEffectClrLst/>
   </dgm:styleLbl>
   <dgm:styleLbl name="parChTrans2D3">
     <dgm:fillClrLst meth="repeat">
-      <a:schemeClr val="accent1"/>
+      <a:schemeClr val="accent4"/>
     </dgm:fillClrLst>
     <dgm:linClrLst meth="repeat">
-      <a:schemeClr val="accent1"/>
+      <a:schemeClr val="lt1"/>
     </dgm:linClrLst>
     <dgm:effectClrLst/>
     <dgm:txLinClrLst/>
-    <dgm:txFillClrLst meth="repeat">
-      <a:schemeClr val="lt1"/>
-    </dgm:txFillClrLst>
+    <dgm:txFillClrLst/>
     <dgm:txEffectClrLst/>
   </dgm:styleLbl>
   <dgm:styleLbl name="parChTrans2D4">
     <dgm:fillClrLst meth="repeat">
-      <a:schemeClr val="accent1"/>
+      <a:schemeClr val="accent5"/>
     </dgm:fillClrLst>
     <dgm:linClrLst meth="repeat">
-      <a:schemeClr val="accent1"/>
+      <a:schemeClr val="lt1"/>
     </dgm:linClrLst>
     <dgm:effectClrLst/>
     <dgm:txLinClrLst/>
@@ -471,12 +518,10 @@
   </dgm:styleLbl>
   <dgm:styleLbl name="parChTrans1D1">
     <dgm:fillClrLst meth="repeat">
-      <a:schemeClr val="accent1"/>
+      <a:schemeClr val="accent2"/>
     </dgm:fillClrLst>
     <dgm:linClrLst meth="repeat">
-      <a:schemeClr val="accent1">
-        <a:shade val="60000"/>
-      </a:schemeClr>
+      <a:schemeClr val="accent2"/>
     </dgm:linClrLst>
     <dgm:effectClrLst/>
     <dgm:txLinClrLst/>
@@ -487,12 +532,12 @@
   </dgm:styleLbl>
   <dgm:styleLbl name="parChTrans1D2">
     <dgm:fillClrLst meth="repeat">
-      <a:schemeClr val="accent1"/>
+      <a:schemeClr val="accent2">
+        <a:tint val="90000"/>
+      </a:schemeClr>
     </dgm:fillClrLst>
     <dgm:linClrLst meth="repeat">
-      <a:schemeClr val="accent1">
-        <a:shade val="60000"/>
-      </a:schemeClr>
+      <a:schemeClr val="accent3"/>
     </dgm:linClrLst>
     <dgm:effectClrLst/>
     <dgm:txLinClrLst/>
@@ -503,12 +548,12 @@
   </dgm:styleLbl>
   <dgm:styleLbl name="parChTrans1D3">
     <dgm:fillClrLst meth="repeat">
-      <a:schemeClr val="accent1"/>
+      <a:schemeClr val="accent2">
+        <a:tint val="70000"/>
+      </a:schemeClr>
     </dgm:fillClrLst>
     <dgm:linClrLst meth="repeat">
-      <a:schemeClr val="accent1">
-        <a:shade val="80000"/>
-      </a:schemeClr>
+      <a:schemeClr val="accent4"/>
     </dgm:linClrLst>
     <dgm:effectClrLst/>
     <dgm:txLinClrLst/>
@@ -519,12 +564,12 @@
   </dgm:styleLbl>
   <dgm:styleLbl name="parChTrans1D4">
     <dgm:fillClrLst meth="repeat">
-      <a:schemeClr val="accent1"/>
+      <a:schemeClr val="accent2">
+        <a:tint val="50000"/>
+      </a:schemeClr>
     </dgm:fillClrLst>
     <dgm:linClrLst meth="repeat">
-      <a:schemeClr val="accent1">
-        <a:shade val="80000"/>
-      </a:schemeClr>
+      <a:schemeClr val="accent5"/>
     </dgm:linClrLst>
     <dgm:effectClrLst/>
     <dgm:txLinClrLst/>
@@ -539,8 +584,9 @@
         <a:alpha val="90000"/>
       </a:schemeClr>
     </dgm:fillClrLst>
-    <dgm:linClrLst meth="repeat">
-      <a:schemeClr val="accent1"/>
+    <dgm:linClrLst>
+      <a:schemeClr val="accent2"/>
+      <a:schemeClr val="accent3"/>
     </dgm:linClrLst>
     <dgm:effectClrLst/>
     <dgm:txLinClrLst/>
@@ -555,8 +601,9 @@
         <a:alpha val="90000"/>
       </a:schemeClr>
     </dgm:fillClrLst>
-    <dgm:linClrLst meth="repeat">
-      <a:schemeClr val="accent1"/>
+    <dgm:linClrLst>
+      <a:schemeClr val="accent2"/>
+      <a:schemeClr val="accent3"/>
     </dgm:linClrLst>
     <dgm:effectClrLst/>
     <dgm:txLinClrLst/>
@@ -571,8 +618,9 @@
         <a:alpha val="90000"/>
       </a:schemeClr>
     </dgm:fillClrLst>
-    <dgm:linClrLst meth="repeat">
-      <a:schemeClr val="accent1"/>
+    <dgm:linClrLst>
+      <a:schemeClr val="accent2"/>
+      <a:schemeClr val="accent3"/>
     </dgm:linClrLst>
     <dgm:effectClrLst/>
     <dgm:txLinClrLst/>
@@ -588,7 +636,7 @@
       </a:schemeClr>
     </dgm:fillClrLst>
     <dgm:linClrLst meth="repeat">
-      <a:schemeClr val="accent1"/>
+      <a:schemeClr val="accent2"/>
     </dgm:linClrLst>
     <dgm:effectClrLst/>
     <dgm:txLinClrLst/>
@@ -603,8 +651,9 @@
         <a:alpha val="90000"/>
       </a:schemeClr>
     </dgm:fillClrLst>
-    <dgm:linClrLst meth="repeat">
-      <a:schemeClr val="accent1"/>
+    <dgm:linClrLst>
+      <a:schemeClr val="accent2"/>
+      <a:schemeClr val="accent3"/>
     </dgm:linClrLst>
     <dgm:effectClrLst/>
     <dgm:txLinClrLst/>
@@ -617,8 +666,9 @@
     <dgm:fillClrLst meth="repeat">
       <a:schemeClr val="lt1"/>
     </dgm:fillClrLst>
-    <dgm:linClrLst meth="repeat">
-      <a:schemeClr val="accent1"/>
+    <dgm:linClrLst>
+      <a:schemeClr val="accent2"/>
+      <a:schemeClr val="accent3"/>
     </dgm:linClrLst>
     <dgm:effectClrLst/>
     <dgm:txLinClrLst/>
@@ -631,8 +681,9 @@
     <dgm:fillClrLst meth="repeat">
       <a:schemeClr val="lt1"/>
     </dgm:fillClrLst>
-    <dgm:linClrLst meth="repeat">
-      <a:schemeClr val="accent1"/>
+    <dgm:linClrLst>
+      <a:schemeClr val="accent2"/>
+      <a:schemeClr val="accent3"/>
     </dgm:linClrLst>
     <dgm:effectClrLst/>
     <dgm:txLinClrLst/>
@@ -645,8 +696,9 @@
     <dgm:fillClrLst meth="repeat">
       <a:schemeClr val="lt1"/>
     </dgm:fillClrLst>
-    <dgm:linClrLst meth="repeat">
-      <a:schemeClr val="accent1"/>
+    <dgm:linClrLst>
+      <a:schemeClr val="accent2"/>
+      <a:schemeClr val="accent3"/>
     </dgm:linClrLst>
     <dgm:effectClrLst/>
     <dgm:txLinClrLst/>
@@ -656,16 +708,24 @@
     <dgm:txEffectClrLst/>
   </dgm:styleLbl>
   <dgm:styleLbl name="fgAccFollowNode1">
-    <dgm:fillClrLst meth="repeat">
-      <a:schemeClr val="accent1">
+    <dgm:fillClrLst>
+      <a:schemeClr val="accent2">
+        <a:tint val="40000"/>
         <a:alpha val="90000"/>
+      </a:schemeClr>
+      <a:schemeClr val="accent3">
         <a:tint val="40000"/>
+        <a:alpha val="90000"/>
       </a:schemeClr>
     </dgm:fillClrLst>
-    <dgm:linClrLst meth="repeat">
-      <a:schemeClr val="accent1">
+    <dgm:linClrLst>
+      <a:schemeClr val="accent2">
+        <a:tint val="40000"/>
         <a:alpha val="90000"/>
+      </a:schemeClr>
+      <a:schemeClr val="accent3">
         <a:tint val="40000"/>
+        <a:alpha val="90000"/>
       </a:schemeClr>
     </dgm:linClrLst>
     <dgm:effectClrLst/>
@@ -676,16 +736,24 @@
     <dgm:txEffectClrLst/>
   </dgm:styleLbl>
   <dgm:styleLbl name="alignAccFollowNode1">
-    <dgm:fillClrLst meth="repeat">
-      <a:schemeClr val="accent1">
+    <dgm:fillClrLst>
+      <a:schemeClr val="accent2">
+        <a:tint val="40000"/>
         <a:alpha val="90000"/>
+      </a:schemeClr>
+      <a:schemeClr val="accent3">
         <a:tint val="40000"/>
+        <a:alpha val="90000"/>
       </a:schemeClr>
     </dgm:fillClrLst>
-    <dgm:linClrLst meth="repeat">
-      <a:schemeClr val="accent1">
+    <dgm:linClrLst>
+      <a:schemeClr val="accent2">
+        <a:tint val="40000"/>
         <a:alpha val="90000"/>
+      </a:schemeClr>
+      <a:schemeClr val="accent3">
         <a:tint val="40000"/>
+        <a:alpha val="90000"/>
       </a:schemeClr>
     </dgm:linClrLst>
     <dgm:effectClrLst/>
@@ -696,16 +764,24 @@
     <dgm:txEffectClrLst/>
   </dgm:styleLbl>
   <dgm:styleLbl name="bgAccFollowNode1">
-    <dgm:fillClrLst meth="repeat">
-      <a:schemeClr val="accent1">
+    <dgm:fillClrLst>
+      <a:schemeClr val="accent2">
+        <a:tint val="40000"/>
         <a:alpha val="90000"/>
+      </a:schemeClr>
+      <a:schemeClr val="accent3">
         <a:tint val="40000"/>
+        <a:alpha val="90000"/>
       </a:schemeClr>
     </dgm:fillClrLst>
-    <dgm:linClrLst meth="repeat">
-      <a:schemeClr val="accent1">
+    <dgm:linClrLst>
+      <a:schemeClr val="accent2">
+        <a:tint val="40000"/>
         <a:alpha val="90000"/>
+      </a:schemeClr>
+      <a:schemeClr val="accent3">
         <a:tint val="40000"/>
+        <a:alpha val="90000"/>
       </a:schemeClr>
     </dgm:linClrLst>
     <dgm:effectClrLst/>
@@ -721,7 +797,7 @@
         <a:alpha val="90000"/>
       </a:schemeClr>
     </dgm:fillClrLst>
-    <dgm:linClrLst meth="repeat">
+    <dgm:linClrLst>
       <a:schemeClr val="accent1"/>
     </dgm:linClrLst>
     <dgm:effectClrLst/>
@@ -737,8 +813,8 @@
         <a:alpha val="90000"/>
       </a:schemeClr>
     </dgm:fillClrLst>
-    <dgm:linClrLst meth="repeat">
-      <a:schemeClr val="accent1"/>
+    <dgm:linClrLst>
+      <a:schemeClr val="accent3"/>
     </dgm:linClrLst>
     <dgm:effectClrLst/>
     <dgm:txLinClrLst/>
@@ -753,8 +829,8 @@
         <a:alpha val="90000"/>
       </a:schemeClr>
     </dgm:fillClrLst>
-    <dgm:linClrLst meth="repeat">
-      <a:schemeClr val="accent1"/>
+    <dgm:linClrLst>
+      <a:schemeClr val="accent4"/>
     </dgm:linClrLst>
     <dgm:effectClrLst/>
     <dgm:txLinClrLst/>
@@ -769,8 +845,8 @@
         <a:alpha val="90000"/>
       </a:schemeClr>
     </dgm:fillClrLst>
-    <dgm:linClrLst meth="repeat">
-      <a:schemeClr val="accent1"/>
+    <dgm:linClrLst>
+      <a:schemeClr val="accent5"/>
     </dgm:linClrLst>
     <dgm:effectClrLst/>
     <dgm:txLinClrLst/>
@@ -781,12 +857,12 @@
   </dgm:styleLbl>
   <dgm:styleLbl name="bgShp">
     <dgm:fillClrLst meth="repeat">
-      <a:schemeClr val="accent1">
+      <a:schemeClr val="accent2">
         <a:tint val="40000"/>
       </a:schemeClr>
     </dgm:fillClrLst>
     <dgm:linClrLst meth="repeat">
-      <a:schemeClr val="accent1"/>
+      <a:schemeClr val="dk1"/>
     </dgm:linClrLst>
     <dgm:effectClrLst/>
     <dgm:txLinClrLst/>
@@ -797,12 +873,12 @@
   </dgm:styleLbl>
   <dgm:styleLbl name="dkBgShp">
     <dgm:fillClrLst meth="repeat">
-      <a:schemeClr val="accent1">
-        <a:shade val="80000"/>
+      <a:schemeClr val="accent2">
+        <a:shade val="90000"/>
       </a:schemeClr>
     </dgm:fillClrLst>
     <dgm:linClrLst meth="repeat">
-      <a:schemeClr val="accent1"/>
+      <a:schemeClr val="dk1"/>
     </dgm:linClrLst>
     <dgm:effectClrLst/>
     <dgm:txLinClrLst/>
@@ -813,13 +889,13 @@
   </dgm:styleLbl>
   <dgm:styleLbl name="trBgShp">
     <dgm:fillClrLst meth="repeat">
-      <a:schemeClr val="accent1">
+      <a:schemeClr val="accent2">
         <a:tint val="50000"/>
         <a:alpha val="40000"/>
       </a:schemeClr>
     </dgm:fillClrLst>
     <dgm:linClrLst meth="repeat">
-      <a:schemeClr val="accent1"/>
+      <a:schemeClr val="accent2"/>
     </dgm:linClrLst>
     <dgm:effectClrLst/>
     <dgm:txLinClrLst/>
@@ -830,8 +906,8 @@
   </dgm:styleLbl>
   <dgm:styleLbl name="fgShp">
     <dgm:fillClrLst meth="repeat">
-      <a:schemeClr val="accent1">
-        <a:tint val="60000"/>
+      <a:schemeClr val="accent2">
+        <a:tint val="40000"/>
       </a:schemeClr>
     </dgm:fillClrLst>
     <dgm:linClrLst meth="repeat">
@@ -869,7 +945,7 @@
 <dgm:dataModel xmlns:dgm="http://schemas.openxmlformats.org/drawingml/2006/diagram" xmlns:a="http://schemas.openxmlformats.org/drawingml/2006/main">
   <dgm:ptLst>
     <dgm:pt modelId="{183F658D-B6E6-48BE-AA6D-0054B612E4FC}" type="doc">
-      <dgm:prSet loTypeId="urn:microsoft.com/office/officeart/2005/8/layout/list1" loCatId="list" qsTypeId="urn:microsoft.com/office/officeart/2005/8/quickstyle/simple1" qsCatId="simple" csTypeId="urn:microsoft.com/office/officeart/2005/8/colors/accent1_2" csCatId="accent1"/>
+      <dgm:prSet loTypeId="urn:microsoft.com/office/officeart/2005/8/layout/vList5" loCatId="list" qsTypeId="urn:microsoft.com/office/officeart/2005/8/quickstyle/simple1" qsCatId="simple" csTypeId="urn:microsoft.com/office/officeart/2005/8/colors/colorful2" csCatId="colorful" phldr="1"/>
       <dgm:spPr/>
       <dgm:t>
         <a:bodyPr/>
@@ -887,8 +963,8 @@
         <a:lstStyle/>
         <a:p>
           <a:r>
-            <a:rPr lang="en-US"/>
-            <a:t>Learning rate (overall and individual)</a:t>
+            <a:rPr lang="en-US" dirty="0"/>
+            <a:t>Learning rate</a:t>
           </a:r>
         </a:p>
       </dgm:t>
@@ -916,14 +992,14 @@
       </dgm:t>
     </dgm:pt>
     <dgm:pt modelId="{AC46BC9D-E394-4DD2-9CCA-50CC131B5A8A}">
-      <dgm:prSet/>
+      <dgm:prSet custT="1"/>
       <dgm:spPr/>
       <dgm:t>
         <a:bodyPr/>
         <a:lstStyle/>
         <a:p>
           <a:r>
-            <a:rPr lang="en-US"/>
+            <a:rPr lang="en-US" sz="2000" dirty="0"/>
             <a:t>How does the number of learned students (binary states) or the class average (continuous states) evolve over time?</a:t>
           </a:r>
         </a:p>
@@ -959,8 +1035,8 @@
         <a:lstStyle/>
         <a:p>
           <a:r>
-            <a:rPr lang="en-US"/>
-            <a:t>Class’s dependence on the initial conditions of the system </a:t>
+            <a:rPr lang="en-US" dirty="0"/>
+            <a:t>Nucleation sites position</a:t>
           </a:r>
         </a:p>
       </dgm:t>
@@ -988,14 +1064,14 @@
       </dgm:t>
     </dgm:pt>
     <dgm:pt modelId="{00D7E641-7E14-47C3-8FC7-FC5F78C58474}">
-      <dgm:prSet/>
+      <dgm:prSet custT="1"/>
       <dgm:spPr/>
       <dgm:t>
         <a:bodyPr/>
         <a:lstStyle/>
         <a:p>
           <a:r>
-            <a:rPr lang="en-US"/>
+            <a:rPr lang="en-US" sz="2000" dirty="0"/>
             <a:t>How does the position of learned/high scoring students affect the learning rate of the class?</a:t>
           </a:r>
         </a:p>
@@ -1031,8 +1107,8 @@
         <a:lstStyle/>
         <a:p>
           <a:r>
-            <a:rPr lang="en-US"/>
-            <a:t>Neighborhood combination based on the aptitude of the students in the neighborhood</a:t>
+            <a:rPr lang="en-US" dirty="0"/>
+            <a:t>Homogeneity</a:t>
           </a:r>
         </a:p>
       </dgm:t>
@@ -1060,14 +1136,14 @@
       </dgm:t>
     </dgm:pt>
     <dgm:pt modelId="{9A6A5F59-FF50-4916-A23C-E4F3DEC34979}">
-      <dgm:prSet/>
+      <dgm:prSet custT="1"/>
       <dgm:spPr/>
       <dgm:t>
         <a:bodyPr/>
         <a:lstStyle/>
         <a:p>
           <a:r>
-            <a:rPr lang="en-US"/>
+            <a:rPr lang="en-US" sz="1800" dirty="0"/>
             <a:t>How does the spatial aptitude homogeneity affect the learning rate of the class?</a:t>
           </a:r>
         </a:p>
@@ -1096,15 +1172,23 @@
       </dgm:t>
     </dgm:pt>
     <dgm:pt modelId="{CD4E005F-3BA1-4702-8E50-37E9EF983DDE}">
-      <dgm:prSet/>
+      <dgm:prSet custT="1"/>
       <dgm:spPr/>
       <dgm:t>
         <a:bodyPr/>
         <a:lstStyle/>
         <a:p>
           <a:r>
-            <a:rPr lang="en-US"/>
-            <a:t>How does the social aspect affect the classroom (Watts–Strogatz model) dynamics</a:t>
+            <a:rPr lang="en-US" sz="1800" dirty="0"/>
+            <a:t>How does the social aspect affect the classroom (Watts–</a:t>
+          </a:r>
+          <a:r>
+            <a:rPr lang="en-US" sz="1800" dirty="0" err="1"/>
+            <a:t>Strogatz</a:t>
+          </a:r>
+          <a:r>
+            <a:rPr lang="en-US" sz="1800" dirty="0"/>
+            <a:t> model) dynamics</a:t>
           </a:r>
         </a:p>
       </dgm:t>
@@ -1131,8 +1215,8 @@
         </a:p>
       </dgm:t>
     </dgm:pt>
-    <dgm:pt modelId="{EAA0535B-E312-44B4-91E6-059FABB30654}" type="pres">
-      <dgm:prSet presAssocID="{183F658D-B6E6-48BE-AA6D-0054B612E4FC}" presName="linear" presStyleCnt="0">
+    <dgm:pt modelId="{C54A7760-4366-4BA7-B0FD-9A47153A3859}" type="pres">
+      <dgm:prSet presAssocID="{183F658D-B6E6-48BE-AA6D-0054B612E4FC}" presName="Name0" presStyleCnt="0">
         <dgm:presLayoutVars>
           <dgm:dir/>
           <dgm:animLvl val="lvl"/>
@@ -1141,95 +1225,71 @@
       </dgm:prSet>
       <dgm:spPr/>
     </dgm:pt>
-    <dgm:pt modelId="{3913CE47-19D1-45F0-978E-74E127216075}" type="pres">
-      <dgm:prSet presAssocID="{CFDD4406-47FA-41E5-AE6C-04E9AAD25A36}" presName="parentLin" presStyleCnt="0"/>
+    <dgm:pt modelId="{EF51F45A-7FBC-40B7-AA60-EB6EE307D391}" type="pres">
+      <dgm:prSet presAssocID="{CFDD4406-47FA-41E5-AE6C-04E9AAD25A36}" presName="linNode" presStyleCnt="0"/>
       <dgm:spPr/>
     </dgm:pt>
-    <dgm:pt modelId="{413B066D-943F-4A9F-B507-A9FADCEAB619}" type="pres">
-      <dgm:prSet presAssocID="{CFDD4406-47FA-41E5-AE6C-04E9AAD25A36}" presName="parentLeftMargin" presStyleLbl="node1" presStyleIdx="0" presStyleCnt="3"/>
-      <dgm:spPr/>
-    </dgm:pt>
-    <dgm:pt modelId="{2DE70E89-FDF7-4A5E-AF60-6C2289A31966}" type="pres">
+    <dgm:pt modelId="{648CFC74-82F6-4E68-9843-F296E9C04D82}" type="pres">
       <dgm:prSet presAssocID="{CFDD4406-47FA-41E5-AE6C-04E9AAD25A36}" presName="parentText" presStyleLbl="node1" presStyleIdx="0" presStyleCnt="3">
         <dgm:presLayoutVars>
-          <dgm:chMax val="0"/>
+          <dgm:chMax val="1"/>
           <dgm:bulletEnabled val="1"/>
         </dgm:presLayoutVars>
       </dgm:prSet>
       <dgm:spPr/>
     </dgm:pt>
-    <dgm:pt modelId="{4A31934C-0688-4D39-8E45-C8E6B7CFC0CB}" type="pres">
-      <dgm:prSet presAssocID="{CFDD4406-47FA-41E5-AE6C-04E9AAD25A36}" presName="negativeSpace" presStyleCnt="0"/>
-      <dgm:spPr/>
-    </dgm:pt>
-    <dgm:pt modelId="{4B86B702-73A5-49BC-9EC8-2946C5BA815F}" type="pres">
-      <dgm:prSet presAssocID="{CFDD4406-47FA-41E5-AE6C-04E9AAD25A36}" presName="childText" presStyleLbl="conFgAcc1" presStyleIdx="0" presStyleCnt="3">
+    <dgm:pt modelId="{EF2A5560-4978-4C90-9B22-9F69917C414F}" type="pres">
+      <dgm:prSet presAssocID="{CFDD4406-47FA-41E5-AE6C-04E9AAD25A36}" presName="descendantText" presStyleLbl="alignAccFollowNode1" presStyleIdx="0" presStyleCnt="3">
         <dgm:presLayoutVars>
           <dgm:bulletEnabled val="1"/>
         </dgm:presLayoutVars>
       </dgm:prSet>
       <dgm:spPr/>
     </dgm:pt>
-    <dgm:pt modelId="{D5CFA4C4-A4F6-4CF6-9B94-BCF12316B319}" type="pres">
-      <dgm:prSet presAssocID="{6AEC7A9C-1D01-4E25-8226-B246D0D2E4FE}" presName="spaceBetweenRectangles" presStyleCnt="0"/>
+    <dgm:pt modelId="{7B7EC6D0-343D-40E0-AD73-6FA4F0334F4E}" type="pres">
+      <dgm:prSet presAssocID="{6AEC7A9C-1D01-4E25-8226-B246D0D2E4FE}" presName="sp" presStyleCnt="0"/>
       <dgm:spPr/>
     </dgm:pt>
-    <dgm:pt modelId="{1D0A9C5E-74E6-4A3B-BCE8-B186935A74EC}" type="pres">
-      <dgm:prSet presAssocID="{37B3F055-FF09-4464-BB1C-5EAEAEF075AF}" presName="parentLin" presStyleCnt="0"/>
+    <dgm:pt modelId="{9DA77A1A-F26A-4074-9A48-B5E52E8EF0E6}" type="pres">
+      <dgm:prSet presAssocID="{37B3F055-FF09-4464-BB1C-5EAEAEF075AF}" presName="linNode" presStyleCnt="0"/>
       <dgm:spPr/>
     </dgm:pt>
-    <dgm:pt modelId="{8A605BDC-7122-475E-972C-EE93BC807124}" type="pres">
-      <dgm:prSet presAssocID="{37B3F055-FF09-4464-BB1C-5EAEAEF075AF}" presName="parentLeftMargin" presStyleLbl="node1" presStyleIdx="0" presStyleCnt="3"/>
-      <dgm:spPr/>
-    </dgm:pt>
-    <dgm:pt modelId="{2F9EE3F9-E6FE-4FFD-AD68-7BCA0A9640CE}" type="pres">
+    <dgm:pt modelId="{10DBD6BB-2828-4E12-86ED-7E8F17A33928}" type="pres">
       <dgm:prSet presAssocID="{37B3F055-FF09-4464-BB1C-5EAEAEF075AF}" presName="parentText" presStyleLbl="node1" presStyleIdx="1" presStyleCnt="3">
         <dgm:presLayoutVars>
-          <dgm:chMax val="0"/>
+          <dgm:chMax val="1"/>
           <dgm:bulletEnabled val="1"/>
         </dgm:presLayoutVars>
       </dgm:prSet>
       <dgm:spPr/>
     </dgm:pt>
-    <dgm:pt modelId="{DA442DDE-5436-4668-8618-FEDB9482F3D1}" type="pres">
-      <dgm:prSet presAssocID="{37B3F055-FF09-4464-BB1C-5EAEAEF075AF}" presName="negativeSpace" presStyleCnt="0"/>
-      <dgm:spPr/>
-    </dgm:pt>
-    <dgm:pt modelId="{6DEE28BF-558E-428A-AAA4-4A30069388B2}" type="pres">
-      <dgm:prSet presAssocID="{37B3F055-FF09-4464-BB1C-5EAEAEF075AF}" presName="childText" presStyleLbl="conFgAcc1" presStyleIdx="1" presStyleCnt="3">
+    <dgm:pt modelId="{BF570F4F-CD7E-40EE-B188-1F0096C3A6ED}" type="pres">
+      <dgm:prSet presAssocID="{37B3F055-FF09-4464-BB1C-5EAEAEF075AF}" presName="descendantText" presStyleLbl="alignAccFollowNode1" presStyleIdx="1" presStyleCnt="3">
         <dgm:presLayoutVars>
           <dgm:bulletEnabled val="1"/>
         </dgm:presLayoutVars>
       </dgm:prSet>
       <dgm:spPr/>
     </dgm:pt>
-    <dgm:pt modelId="{A97D4688-04C0-4765-BF58-14187707F9AC}" type="pres">
-      <dgm:prSet presAssocID="{1B05699E-BEF1-4495-96AC-3E43F7548238}" presName="spaceBetweenRectangles" presStyleCnt="0"/>
+    <dgm:pt modelId="{9DC0DBBF-2EA9-4443-A242-070549A6A8DE}" type="pres">
+      <dgm:prSet presAssocID="{1B05699E-BEF1-4495-96AC-3E43F7548238}" presName="sp" presStyleCnt="0"/>
       <dgm:spPr/>
     </dgm:pt>
-    <dgm:pt modelId="{0DEEE13A-B7AB-4BB5-AD29-A157D5B4682E}" type="pres">
-      <dgm:prSet presAssocID="{8C7B7D1C-730F-4321-843D-D3AEEAE3F730}" presName="parentLin" presStyleCnt="0"/>
+    <dgm:pt modelId="{E8D112EF-F2DD-4556-A43D-3446221FF630}" type="pres">
+      <dgm:prSet presAssocID="{8C7B7D1C-730F-4321-843D-D3AEEAE3F730}" presName="linNode" presStyleCnt="0"/>
       <dgm:spPr/>
     </dgm:pt>
-    <dgm:pt modelId="{51021062-D7A0-4A3A-B783-AC1D044AB91B}" type="pres">
-      <dgm:prSet presAssocID="{8C7B7D1C-730F-4321-843D-D3AEEAE3F730}" presName="parentLeftMargin" presStyleLbl="node1" presStyleIdx="1" presStyleCnt="3"/>
-      <dgm:spPr/>
-    </dgm:pt>
-    <dgm:pt modelId="{A0EBEC60-01D8-4B8F-9779-EC76D1742AC0}" type="pres">
+    <dgm:pt modelId="{D498137B-4C1A-42E4-AAF6-2720CCB4BBB1}" type="pres">
       <dgm:prSet presAssocID="{8C7B7D1C-730F-4321-843D-D3AEEAE3F730}" presName="parentText" presStyleLbl="node1" presStyleIdx="2" presStyleCnt="3">
         <dgm:presLayoutVars>
-          <dgm:chMax val="0"/>
+          <dgm:chMax val="1"/>
           <dgm:bulletEnabled val="1"/>
         </dgm:presLayoutVars>
       </dgm:prSet>
       <dgm:spPr/>
     </dgm:pt>
-    <dgm:pt modelId="{81DB20B1-4291-49C0-AE2F-106ADF433C4B}" type="pres">
-      <dgm:prSet presAssocID="{8C7B7D1C-730F-4321-843D-D3AEEAE3F730}" presName="negativeSpace" presStyleCnt="0"/>
-      <dgm:spPr/>
-    </dgm:pt>
-    <dgm:pt modelId="{F9156637-53A8-4970-8D11-430523CE1E85}" type="pres">
-      <dgm:prSet presAssocID="{8C7B7D1C-730F-4321-843D-D3AEEAE3F730}" presName="childText" presStyleLbl="conFgAcc1" presStyleIdx="2" presStyleCnt="3">
+    <dgm:pt modelId="{DDEAD7B9-174E-4B85-9E31-C4487C5C4098}" type="pres">
+      <dgm:prSet presAssocID="{8C7B7D1C-730F-4321-843D-D3AEEAE3F730}" presName="descendantText" presStyleLbl="alignAccFollowNode1" presStyleIdx="2" presStyleCnt="3">
         <dgm:presLayoutVars>
           <dgm:bulletEnabled val="1"/>
         </dgm:presLayoutVars>
@@ -1238,47 +1298,38 @@
     </dgm:pt>
   </dgm:ptLst>
   <dgm:cxnLst>
+    <dgm:cxn modelId="{14B47505-E061-4A01-AC0B-AE8E62F27FAB}" type="presOf" srcId="{37B3F055-FF09-4464-BB1C-5EAEAEF075AF}" destId="{10DBD6BB-2828-4E12-86ED-7E8F17A33928}" srcOrd="0" destOrd="0" presId="urn:microsoft.com/office/officeart/2005/8/layout/vList5"/>
+    <dgm:cxn modelId="{D96A440A-CB89-46E7-B36D-2CF6E1D3DC13}" type="presOf" srcId="{AC46BC9D-E394-4DD2-9CCA-50CC131B5A8A}" destId="{EF2A5560-4978-4C90-9B22-9F69917C414F}" srcOrd="0" destOrd="0" presId="urn:microsoft.com/office/officeart/2005/8/layout/vList5"/>
     <dgm:cxn modelId="{0F659F0F-DA4F-4BA2-8837-D826A3E5DB5B}" srcId="{183F658D-B6E6-48BE-AA6D-0054B612E4FC}" destId="{CFDD4406-47FA-41E5-AE6C-04E9AAD25A36}" srcOrd="0" destOrd="0" parTransId="{75995697-E27F-4912-A828-FE86147F0DD7}" sibTransId="{6AEC7A9C-1D01-4E25-8226-B246D0D2E4FE}"/>
-    <dgm:cxn modelId="{7F3CFA10-E4B0-411D-9D97-15F478482A0E}" type="presOf" srcId="{AC46BC9D-E394-4DD2-9CCA-50CC131B5A8A}" destId="{4B86B702-73A5-49BC-9EC8-2946C5BA815F}" srcOrd="0" destOrd="0" presId="urn:microsoft.com/office/officeart/2005/8/layout/list1"/>
-    <dgm:cxn modelId="{A6186827-3C3C-4143-8D7F-0D42241C7702}" type="presOf" srcId="{37B3F055-FF09-4464-BB1C-5EAEAEF075AF}" destId="{2F9EE3F9-E6FE-4FFD-AD68-7BCA0A9640CE}" srcOrd="1" destOrd="0" presId="urn:microsoft.com/office/officeart/2005/8/layout/list1"/>
-    <dgm:cxn modelId="{8C996E49-921C-4DCD-9904-9F77B9B1CB87}" type="presOf" srcId="{9A6A5F59-FF50-4916-A23C-E4F3DEC34979}" destId="{F9156637-53A8-4970-8D11-430523CE1E85}" srcOrd="0" destOrd="0" presId="urn:microsoft.com/office/officeart/2005/8/layout/list1"/>
+    <dgm:cxn modelId="{97E25414-5F3C-42BA-A524-6934D129B5C4}" type="presOf" srcId="{8C7B7D1C-730F-4321-843D-D3AEEAE3F730}" destId="{D498137B-4C1A-42E4-AAF6-2720CCB4BBB1}" srcOrd="0" destOrd="0" presId="urn:microsoft.com/office/officeart/2005/8/layout/vList5"/>
+    <dgm:cxn modelId="{9A6ECD15-F387-426A-812A-03BF4BF40F0F}" type="presOf" srcId="{00D7E641-7E14-47C3-8FC7-FC5F78C58474}" destId="{BF570F4F-CD7E-40EE-B188-1F0096C3A6ED}" srcOrd="0" destOrd="0" presId="urn:microsoft.com/office/officeart/2005/8/layout/vList5"/>
     <dgm:cxn modelId="{F7D59E49-D5FD-42E4-8111-E48C4A3D5823}" srcId="{37B3F055-FF09-4464-BB1C-5EAEAEF075AF}" destId="{00D7E641-7E14-47C3-8FC7-FC5F78C58474}" srcOrd="0" destOrd="0" parTransId="{766A2A75-F989-4441-9B8A-25108876F87E}" sibTransId="{0534DB8A-BB0C-4C25-A97B-B8C9ED6EC9A6}"/>
-    <dgm:cxn modelId="{74C1C54D-E380-4B6D-BC3C-2D4655E8F3B4}" type="presOf" srcId="{CFDD4406-47FA-41E5-AE6C-04E9AAD25A36}" destId="{2DE70E89-FDF7-4A5E-AF60-6C2289A31966}" srcOrd="1" destOrd="0" presId="urn:microsoft.com/office/officeart/2005/8/layout/list1"/>
-    <dgm:cxn modelId="{3D5C574F-BD56-4481-AF4B-7D86B930D14F}" type="presOf" srcId="{CD4E005F-3BA1-4702-8E50-37E9EF983DDE}" destId="{F9156637-53A8-4970-8D11-430523CE1E85}" srcOrd="0" destOrd="1" presId="urn:microsoft.com/office/officeart/2005/8/layout/list1"/>
+    <dgm:cxn modelId="{2A6DC76D-33EC-4775-87AE-23F147DB3200}" type="presOf" srcId="{CD4E005F-3BA1-4702-8E50-37E9EF983DDE}" destId="{DDEAD7B9-174E-4B85-9E31-C4487C5C4098}" srcOrd="0" destOrd="1" presId="urn:microsoft.com/office/officeart/2005/8/layout/vList5"/>
     <dgm:cxn modelId="{A5006151-DF72-4E4B-B3BF-7BE3DB8C4501}" srcId="{8C7B7D1C-730F-4321-843D-D3AEEAE3F730}" destId="{9A6A5F59-FF50-4916-A23C-E4F3DEC34979}" srcOrd="0" destOrd="0" parTransId="{EFDCDBA0-46E6-4F36-AD6D-1D24D80D7AA1}" sibTransId="{83974ABB-8D37-4BDF-82E8-A2EB01BCBF69}"/>
     <dgm:cxn modelId="{B3901F77-8CD1-4BF7-9268-12FEC5F3CA90}" srcId="{183F658D-B6E6-48BE-AA6D-0054B612E4FC}" destId="{8C7B7D1C-730F-4321-843D-D3AEEAE3F730}" srcOrd="2" destOrd="0" parTransId="{16D7CE83-E8E6-44F5-82F5-5317862E037E}" sibTransId="{AF3768A8-16E3-4A43-AE3D-1B1D2BDF97C3}"/>
-    <dgm:cxn modelId="{C38C1E78-BC19-4A50-AAEE-584E2F179B0E}" type="presOf" srcId="{00D7E641-7E14-47C3-8FC7-FC5F78C58474}" destId="{6DEE28BF-558E-428A-AAA4-4A30069388B2}" srcOrd="0" destOrd="0" presId="urn:microsoft.com/office/officeart/2005/8/layout/list1"/>
-    <dgm:cxn modelId="{6FADF27A-D3E8-4E8D-AA23-FDAE8D97BA39}" type="presOf" srcId="{37B3F055-FF09-4464-BB1C-5EAEAEF075AF}" destId="{8A605BDC-7122-475E-972C-EE93BC807124}" srcOrd="0" destOrd="0" presId="urn:microsoft.com/office/officeart/2005/8/layout/list1"/>
+    <dgm:cxn modelId="{7C2A7C89-B974-41B3-A8C5-A92BE396E7BB}" type="presOf" srcId="{9A6A5F59-FF50-4916-A23C-E4F3DEC34979}" destId="{DDEAD7B9-174E-4B85-9E31-C4487C5C4098}" srcOrd="0" destOrd="0" presId="urn:microsoft.com/office/officeart/2005/8/layout/vList5"/>
     <dgm:cxn modelId="{98528E90-19AC-4628-92BA-7A3C872CA34A}" srcId="{8C7B7D1C-730F-4321-843D-D3AEEAE3F730}" destId="{CD4E005F-3BA1-4702-8E50-37E9EF983DDE}" srcOrd="1" destOrd="0" parTransId="{58A96709-D519-456C-885B-0FA964616404}" sibTransId="{6E1FB586-FDB9-4113-BFE2-6F1DC7F121B7}"/>
-    <dgm:cxn modelId="{CF971FAC-C88D-4336-9E6C-F1182EB58FC3}" type="presOf" srcId="{8C7B7D1C-730F-4321-843D-D3AEEAE3F730}" destId="{A0EBEC60-01D8-4B8F-9779-EC76D1742AC0}" srcOrd="1" destOrd="0" presId="urn:microsoft.com/office/officeart/2005/8/layout/list1"/>
-    <dgm:cxn modelId="{B05ADAB0-7488-4539-89E1-39B362A803D9}" type="presOf" srcId="{183F658D-B6E6-48BE-AA6D-0054B612E4FC}" destId="{EAA0535B-E312-44B4-91E6-059FABB30654}" srcOrd="0" destOrd="0" presId="urn:microsoft.com/office/officeart/2005/8/layout/list1"/>
     <dgm:cxn modelId="{4F2ACEBC-93A0-4DF4-8B4B-8548FA52451E}" srcId="{CFDD4406-47FA-41E5-AE6C-04E9AAD25A36}" destId="{AC46BC9D-E394-4DD2-9CCA-50CC131B5A8A}" srcOrd="0" destOrd="0" parTransId="{44D77C92-6398-4F6D-B358-A60077114340}" sibTransId="{A4FFA509-31D8-4AB9-BEF2-43A222144B56}"/>
-    <dgm:cxn modelId="{815E02DB-9F06-488D-8761-47225CB83C8A}" type="presOf" srcId="{CFDD4406-47FA-41E5-AE6C-04E9AAD25A36}" destId="{413B066D-943F-4A9F-B507-A9FADCEAB619}" srcOrd="0" destOrd="0" presId="urn:microsoft.com/office/officeart/2005/8/layout/list1"/>
     <dgm:cxn modelId="{78B7FCE4-D08F-4F4D-B0A2-CF3C529A3F28}" srcId="{183F658D-B6E6-48BE-AA6D-0054B612E4FC}" destId="{37B3F055-FF09-4464-BB1C-5EAEAEF075AF}" srcOrd="1" destOrd="0" parTransId="{CCCF97B7-D678-4F35-86D6-457E6D164093}" sibTransId="{1B05699E-BEF1-4495-96AC-3E43F7548238}"/>
-    <dgm:cxn modelId="{DCDDF6EA-52B3-4CD4-B1EC-4E8DC8B19A74}" type="presOf" srcId="{8C7B7D1C-730F-4321-843D-D3AEEAE3F730}" destId="{51021062-D7A0-4A3A-B783-AC1D044AB91B}" srcOrd="0" destOrd="0" presId="urn:microsoft.com/office/officeart/2005/8/layout/list1"/>
-    <dgm:cxn modelId="{055B8AEA-6867-47E0-B0E3-FFB3AE5C57FE}" type="presParOf" srcId="{EAA0535B-E312-44B4-91E6-059FABB30654}" destId="{3913CE47-19D1-45F0-978E-74E127216075}" srcOrd="0" destOrd="0" presId="urn:microsoft.com/office/officeart/2005/8/layout/list1"/>
-    <dgm:cxn modelId="{642F1388-D974-48EB-A1E1-3C25128DE6C5}" type="presParOf" srcId="{3913CE47-19D1-45F0-978E-74E127216075}" destId="{413B066D-943F-4A9F-B507-A9FADCEAB619}" srcOrd="0" destOrd="0" presId="urn:microsoft.com/office/officeart/2005/8/layout/list1"/>
-    <dgm:cxn modelId="{6AF35F03-9FF1-4FF8-A872-32714E1B8291}" type="presParOf" srcId="{3913CE47-19D1-45F0-978E-74E127216075}" destId="{2DE70E89-FDF7-4A5E-AF60-6C2289A31966}" srcOrd="1" destOrd="0" presId="urn:microsoft.com/office/officeart/2005/8/layout/list1"/>
-    <dgm:cxn modelId="{27A04DBC-8447-428B-9087-413DF98265E8}" type="presParOf" srcId="{EAA0535B-E312-44B4-91E6-059FABB30654}" destId="{4A31934C-0688-4D39-8E45-C8E6B7CFC0CB}" srcOrd="1" destOrd="0" presId="urn:microsoft.com/office/officeart/2005/8/layout/list1"/>
-    <dgm:cxn modelId="{4A91A56F-99BA-4A17-BB6E-FCCFD4268179}" type="presParOf" srcId="{EAA0535B-E312-44B4-91E6-059FABB30654}" destId="{4B86B702-73A5-49BC-9EC8-2946C5BA815F}" srcOrd="2" destOrd="0" presId="urn:microsoft.com/office/officeart/2005/8/layout/list1"/>
-    <dgm:cxn modelId="{5B620AFA-29B5-4E17-B8DB-063B1AF6F245}" type="presParOf" srcId="{EAA0535B-E312-44B4-91E6-059FABB30654}" destId="{D5CFA4C4-A4F6-4CF6-9B94-BCF12316B319}" srcOrd="3" destOrd="0" presId="urn:microsoft.com/office/officeart/2005/8/layout/list1"/>
-    <dgm:cxn modelId="{DE4F4BC9-0DCF-4C6D-8C43-C4B1552BC02D}" type="presParOf" srcId="{EAA0535B-E312-44B4-91E6-059FABB30654}" destId="{1D0A9C5E-74E6-4A3B-BCE8-B186935A74EC}" srcOrd="4" destOrd="0" presId="urn:microsoft.com/office/officeart/2005/8/layout/list1"/>
-    <dgm:cxn modelId="{F125A692-559F-499C-B125-1CFD539C3225}" type="presParOf" srcId="{1D0A9C5E-74E6-4A3B-BCE8-B186935A74EC}" destId="{8A605BDC-7122-475E-972C-EE93BC807124}" srcOrd="0" destOrd="0" presId="urn:microsoft.com/office/officeart/2005/8/layout/list1"/>
-    <dgm:cxn modelId="{502E7313-CF7F-4DF0-824F-6F4E7020CB0A}" type="presParOf" srcId="{1D0A9C5E-74E6-4A3B-BCE8-B186935A74EC}" destId="{2F9EE3F9-E6FE-4FFD-AD68-7BCA0A9640CE}" srcOrd="1" destOrd="0" presId="urn:microsoft.com/office/officeart/2005/8/layout/list1"/>
-    <dgm:cxn modelId="{771FF0A4-792A-4E0F-8123-A85124CFCF1B}" type="presParOf" srcId="{EAA0535B-E312-44B4-91E6-059FABB30654}" destId="{DA442DDE-5436-4668-8618-FEDB9482F3D1}" srcOrd="5" destOrd="0" presId="urn:microsoft.com/office/officeart/2005/8/layout/list1"/>
-    <dgm:cxn modelId="{5135D059-47BB-4980-8812-36C9FA74BFE9}" type="presParOf" srcId="{EAA0535B-E312-44B4-91E6-059FABB30654}" destId="{6DEE28BF-558E-428A-AAA4-4A30069388B2}" srcOrd="6" destOrd="0" presId="urn:microsoft.com/office/officeart/2005/8/layout/list1"/>
-    <dgm:cxn modelId="{9D3FAD8C-37E4-4BF7-BFC2-302F50048BFD}" type="presParOf" srcId="{EAA0535B-E312-44B4-91E6-059FABB30654}" destId="{A97D4688-04C0-4765-BF58-14187707F9AC}" srcOrd="7" destOrd="0" presId="urn:microsoft.com/office/officeart/2005/8/layout/list1"/>
-    <dgm:cxn modelId="{615D64EE-3EEE-49B3-AC3D-2AF51800249F}" type="presParOf" srcId="{EAA0535B-E312-44B4-91E6-059FABB30654}" destId="{0DEEE13A-B7AB-4BB5-AD29-A157D5B4682E}" srcOrd="8" destOrd="0" presId="urn:microsoft.com/office/officeart/2005/8/layout/list1"/>
-    <dgm:cxn modelId="{C2D0A0B6-69D3-4866-9621-DCBB1A936192}" type="presParOf" srcId="{0DEEE13A-B7AB-4BB5-AD29-A157D5B4682E}" destId="{51021062-D7A0-4A3A-B783-AC1D044AB91B}" srcOrd="0" destOrd="0" presId="urn:microsoft.com/office/officeart/2005/8/layout/list1"/>
-    <dgm:cxn modelId="{8991B116-AF23-4A1B-AA63-4CF41E2BA22A}" type="presParOf" srcId="{0DEEE13A-B7AB-4BB5-AD29-A157D5B4682E}" destId="{A0EBEC60-01D8-4B8F-9779-EC76D1742AC0}" srcOrd="1" destOrd="0" presId="urn:microsoft.com/office/officeart/2005/8/layout/list1"/>
-    <dgm:cxn modelId="{64B2FA0D-71DB-4A17-9FE4-8DC2330FCFD0}" type="presParOf" srcId="{EAA0535B-E312-44B4-91E6-059FABB30654}" destId="{81DB20B1-4291-49C0-AE2F-106ADF433C4B}" srcOrd="9" destOrd="0" presId="urn:microsoft.com/office/officeart/2005/8/layout/list1"/>
-    <dgm:cxn modelId="{C054E508-3EFC-4BDA-BEC5-BD89F306B373}" type="presParOf" srcId="{EAA0535B-E312-44B4-91E6-059FABB30654}" destId="{F9156637-53A8-4970-8D11-430523CE1E85}" srcOrd="10" destOrd="0" presId="urn:microsoft.com/office/officeart/2005/8/layout/list1"/>
+    <dgm:cxn modelId="{2682DDE7-FA3F-4488-8673-9A2134DAD2BB}" type="presOf" srcId="{183F658D-B6E6-48BE-AA6D-0054B612E4FC}" destId="{C54A7760-4366-4BA7-B0FD-9A47153A3859}" srcOrd="0" destOrd="0" presId="urn:microsoft.com/office/officeart/2005/8/layout/vList5"/>
+    <dgm:cxn modelId="{D598B2F2-EA95-4E94-BA8B-7AB50A31934C}" type="presOf" srcId="{CFDD4406-47FA-41E5-AE6C-04E9AAD25A36}" destId="{648CFC74-82F6-4E68-9843-F296E9C04D82}" srcOrd="0" destOrd="0" presId="urn:microsoft.com/office/officeart/2005/8/layout/vList5"/>
+    <dgm:cxn modelId="{4336596D-6F25-4D57-A5CF-BFEC0A7B5E70}" type="presParOf" srcId="{C54A7760-4366-4BA7-B0FD-9A47153A3859}" destId="{EF51F45A-7FBC-40B7-AA60-EB6EE307D391}" srcOrd="0" destOrd="0" presId="urn:microsoft.com/office/officeart/2005/8/layout/vList5"/>
+    <dgm:cxn modelId="{B9305AF5-C8C3-4A79-995F-E7653DB1214F}" type="presParOf" srcId="{EF51F45A-7FBC-40B7-AA60-EB6EE307D391}" destId="{648CFC74-82F6-4E68-9843-F296E9C04D82}" srcOrd="0" destOrd="0" presId="urn:microsoft.com/office/officeart/2005/8/layout/vList5"/>
+    <dgm:cxn modelId="{AA6FF61B-44DF-42D1-AE38-D41C33C8E50C}" type="presParOf" srcId="{EF51F45A-7FBC-40B7-AA60-EB6EE307D391}" destId="{EF2A5560-4978-4C90-9B22-9F69917C414F}" srcOrd="1" destOrd="0" presId="urn:microsoft.com/office/officeart/2005/8/layout/vList5"/>
+    <dgm:cxn modelId="{196A3744-632B-44BE-9F96-5203DC31C6C2}" type="presParOf" srcId="{C54A7760-4366-4BA7-B0FD-9A47153A3859}" destId="{7B7EC6D0-343D-40E0-AD73-6FA4F0334F4E}" srcOrd="1" destOrd="0" presId="urn:microsoft.com/office/officeart/2005/8/layout/vList5"/>
+    <dgm:cxn modelId="{CAC447FE-8BD7-4F4F-9013-67609982101D}" type="presParOf" srcId="{C54A7760-4366-4BA7-B0FD-9A47153A3859}" destId="{9DA77A1A-F26A-4074-9A48-B5E52E8EF0E6}" srcOrd="2" destOrd="0" presId="urn:microsoft.com/office/officeart/2005/8/layout/vList5"/>
+    <dgm:cxn modelId="{59CD2DF7-DFF3-4A3B-8716-D6391960FD49}" type="presParOf" srcId="{9DA77A1A-F26A-4074-9A48-B5E52E8EF0E6}" destId="{10DBD6BB-2828-4E12-86ED-7E8F17A33928}" srcOrd="0" destOrd="0" presId="urn:microsoft.com/office/officeart/2005/8/layout/vList5"/>
+    <dgm:cxn modelId="{CB82D032-2C5B-4937-852C-A68D674306EB}" type="presParOf" srcId="{9DA77A1A-F26A-4074-9A48-B5E52E8EF0E6}" destId="{BF570F4F-CD7E-40EE-B188-1F0096C3A6ED}" srcOrd="1" destOrd="0" presId="urn:microsoft.com/office/officeart/2005/8/layout/vList5"/>
+    <dgm:cxn modelId="{C17B53AB-A42C-4DAB-9B56-36FD0C96AC44}" type="presParOf" srcId="{C54A7760-4366-4BA7-B0FD-9A47153A3859}" destId="{9DC0DBBF-2EA9-4443-A242-070549A6A8DE}" srcOrd="3" destOrd="0" presId="urn:microsoft.com/office/officeart/2005/8/layout/vList5"/>
+    <dgm:cxn modelId="{32DF61B3-875D-4857-B74E-C50D6F809C28}" type="presParOf" srcId="{C54A7760-4366-4BA7-B0FD-9A47153A3859}" destId="{E8D112EF-F2DD-4556-A43D-3446221FF630}" srcOrd="4" destOrd="0" presId="urn:microsoft.com/office/officeart/2005/8/layout/vList5"/>
+    <dgm:cxn modelId="{D3764C4A-FA26-4385-9997-E74B1DA7472E}" type="presParOf" srcId="{E8D112EF-F2DD-4556-A43D-3446221FF630}" destId="{D498137B-4C1A-42E4-AAF6-2720CCB4BBB1}" srcOrd="0" destOrd="0" presId="urn:microsoft.com/office/officeart/2005/8/layout/vList5"/>
+    <dgm:cxn modelId="{D2FC7003-368C-467B-AF61-CAB299FBB185}" type="presParOf" srcId="{E8D112EF-F2DD-4556-A43D-3446221FF630}" destId="{DDEAD7B9-174E-4B85-9E31-C4487C5C4098}" srcOrd="1" destOrd="0" presId="urn:microsoft.com/office/officeart/2005/8/layout/vList5"/>
   </dgm:cxnLst>
   <dgm:bg/>
   <dgm:whole/>
   <dgm:extLst>
     <a:ext uri="http://schemas.microsoft.com/office/drawing/2008/diagram">
-      <dsp:dataModelExt xmlns:dsp="http://schemas.microsoft.com/office/drawing/2008/diagram" relId="rId6" minVer="http://schemas.openxmlformats.org/drawingml/2006/diagram"/>
+      <dsp:dataModelExt xmlns:dsp="http://schemas.microsoft.com/office/drawing/2008/diagram" relId="rId7" minVer="http://schemas.openxmlformats.org/drawingml/2006/diagram"/>
     </a:ext>
   </dgm:extLst>
 </dgm:dataModel>
@@ -1292,21 +1343,22 @@
       <dsp:cNvGrpSpPr/>
     </dsp:nvGrpSpPr>
     <dsp:grpSpPr/>
-    <dsp:sp modelId="{4B86B702-73A5-49BC-9EC8-2946C5BA815F}">
+    <dsp:sp modelId="{EF2A5560-4978-4C90-9B22-9F69917C414F}">
       <dsp:nvSpPr>
         <dsp:cNvPr id="0" name=""/>
         <dsp:cNvSpPr/>
       </dsp:nvSpPr>
       <dsp:spPr>
-        <a:xfrm>
-          <a:off x="0" y="2064973"/>
-          <a:ext cx="6797675" cy="382725"/>
+        <a:xfrm rot="5400000">
+          <a:off x="6351662" y="-2606777"/>
+          <a:ext cx="976098" cy="6437376"/>
         </a:xfrm>
-        <a:prstGeom prst="rect">
+        <a:prstGeom prst="round2SameRect">
           <a:avLst/>
         </a:prstGeom>
         <a:solidFill>
-          <a:schemeClr val="lt1">
+          <a:schemeClr val="accent2">
+            <a:tint val="40000"/>
             <a:alpha val="90000"/>
             <a:hueOff val="0"/>
             <a:satOff val="0"/>
@@ -1316,7 +1368,9 @@
         </a:solidFill>
         <a:ln w="15875" cap="flat" cmpd="sng" algn="ctr">
           <a:solidFill>
-            <a:schemeClr val="accent1">
+            <a:schemeClr val="accent2">
+              <a:tint val="40000"/>
+              <a:alpha val="90000"/>
               <a:hueOff val="0"/>
               <a:satOff val="0"/>
               <a:lumOff val="0"/>
@@ -1340,12 +1394,12 @@
         <a:fontRef idx="minor"/>
       </dsp:style>
       <dsp:txBody>
-        <a:bodyPr spcFirstLastPara="0" vert="horz" wrap="square" lIns="527575" tIns="187452" rIns="527575" bIns="64008" numCol="1" spcCol="1270" anchor="t" anchorCtr="0">
+        <a:bodyPr spcFirstLastPara="0" vert="horz" wrap="square" lIns="247650" tIns="123825" rIns="247650" bIns="123825" numCol="1" spcCol="1270" anchor="ctr" anchorCtr="0">
           <a:noAutofit/>
         </a:bodyPr>
         <a:lstStyle/>
         <a:p>
-          <a:pPr marL="57150" lvl="1" indent="-57150" algn="l" defTabSz="400050">
+          <a:pPr marL="228600" lvl="1" indent="-228600" algn="l" defTabSz="889000">
             <a:lnSpc>
               <a:spcPct val="90000"/>
             </a:lnSpc>
@@ -1358,31 +1412,31 @@
             <a:buChar char="•"/>
           </a:pPr>
           <a:r>
-            <a:rPr lang="en-US" sz="900" kern="1200"/>
+            <a:rPr lang="en-US" sz="2000" kern="1200" dirty="0"/>
             <a:t>How does the number of learned students (binary states) or the class average (continuous states) evolve over time?</a:t>
           </a:r>
         </a:p>
       </dsp:txBody>
-      <dsp:txXfrm>
-        <a:off x="0" y="2064973"/>
-        <a:ext cx="6797675" cy="382725"/>
+      <dsp:txXfrm rot="-5400000">
+        <a:off x="3621024" y="171510"/>
+        <a:ext cx="6389727" cy="880800"/>
       </dsp:txXfrm>
     </dsp:sp>
-    <dsp:sp modelId="{2DE70E89-FDF7-4A5E-AF60-6C2289A31966}">
+    <dsp:sp modelId="{648CFC74-82F6-4E68-9843-F296E9C04D82}">
       <dsp:nvSpPr>
         <dsp:cNvPr id="0" name=""/>
         <dsp:cNvSpPr/>
       </dsp:nvSpPr>
       <dsp:spPr>
         <a:xfrm>
-          <a:off x="339883" y="1932133"/>
-          <a:ext cx="4758372" cy="265680"/>
+          <a:off x="0" y="1848"/>
+          <a:ext cx="3621024" cy="1220123"/>
         </a:xfrm>
         <a:prstGeom prst="roundRect">
           <a:avLst/>
         </a:prstGeom>
         <a:solidFill>
-          <a:schemeClr val="accent1">
+          <a:schemeClr val="accent2">
             <a:hueOff val="0"/>
             <a:satOff val="0"/>
             <a:lumOff val="0"/>
@@ -1417,12 +1471,12 @@
         </a:fontRef>
       </dsp:style>
       <dsp:txBody>
-        <a:bodyPr spcFirstLastPara="0" vert="horz" wrap="square" lIns="179855" tIns="0" rIns="179855" bIns="0" numCol="1" spcCol="1270" anchor="ctr" anchorCtr="0">
+        <a:bodyPr spcFirstLastPara="0" vert="horz" wrap="square" lIns="129540" tIns="64770" rIns="129540" bIns="64770" numCol="1" spcCol="1270" anchor="ctr" anchorCtr="0">
           <a:noAutofit/>
         </a:bodyPr>
         <a:lstStyle/>
         <a:p>
-          <a:pPr marL="0" lvl="0" indent="0" algn="l" defTabSz="400050">
+          <a:pPr marL="0" lvl="0" indent="0" algn="ctr" defTabSz="1511300">
             <a:lnSpc>
               <a:spcPct val="90000"/>
             </a:lnSpc>
@@ -1435,44 +1489,47 @@
             <a:buNone/>
           </a:pPr>
           <a:r>
-            <a:rPr lang="en-US" sz="900" kern="1200"/>
-            <a:t>Learning rate (overall and individual)</a:t>
+            <a:rPr lang="en-US" sz="3400" kern="1200" dirty="0"/>
+            <a:t>Learning rate</a:t>
           </a:r>
         </a:p>
       </dsp:txBody>
       <dsp:txXfrm>
-        <a:off x="352852" y="1945102"/>
-        <a:ext cx="4732434" cy="239742"/>
+        <a:off x="59561" y="61409"/>
+        <a:ext cx="3501902" cy="1101001"/>
       </dsp:txXfrm>
     </dsp:sp>
-    <dsp:sp modelId="{6DEE28BF-558E-428A-AAA4-4A30069388B2}">
+    <dsp:sp modelId="{BF570F4F-CD7E-40EE-B188-1F0096C3A6ED}">
       <dsp:nvSpPr>
         <dsp:cNvPr id="0" name=""/>
         <dsp:cNvSpPr/>
       </dsp:nvSpPr>
       <dsp:spPr>
-        <a:xfrm>
-          <a:off x="0" y="2629138"/>
-          <a:ext cx="6797675" cy="382725"/>
+        <a:xfrm rot="5400000">
+          <a:off x="6351662" y="-1325648"/>
+          <a:ext cx="976098" cy="6437376"/>
         </a:xfrm>
-        <a:prstGeom prst="rect">
+        <a:prstGeom prst="round2SameRect">
           <a:avLst/>
         </a:prstGeom>
         <a:solidFill>
-          <a:schemeClr val="lt1">
+          <a:schemeClr val="accent2">
+            <a:tint val="40000"/>
             <a:alpha val="90000"/>
-            <a:hueOff val="0"/>
-            <a:satOff val="0"/>
-            <a:lumOff val="0"/>
+            <a:hueOff val="-928920"/>
+            <a:satOff val="1961"/>
+            <a:lumOff val="202"/>
             <a:alphaOff val="0"/>
           </a:schemeClr>
         </a:solidFill>
         <a:ln w="15875" cap="flat" cmpd="sng" algn="ctr">
           <a:solidFill>
-            <a:schemeClr val="accent1">
-              <a:hueOff val="0"/>
-              <a:satOff val="0"/>
-              <a:lumOff val="0"/>
+            <a:schemeClr val="accent2">
+              <a:tint val="40000"/>
+              <a:alpha val="90000"/>
+              <a:hueOff val="-928920"/>
+              <a:satOff val="1961"/>
+              <a:lumOff val="202"/>
               <a:alphaOff val="0"/>
             </a:schemeClr>
           </a:solidFill>
@@ -1493,12 +1550,12 @@
         <a:fontRef idx="minor"/>
       </dsp:style>
       <dsp:txBody>
-        <a:bodyPr spcFirstLastPara="0" vert="horz" wrap="square" lIns="527575" tIns="187452" rIns="527575" bIns="64008" numCol="1" spcCol="1270" anchor="t" anchorCtr="0">
+        <a:bodyPr spcFirstLastPara="0" vert="horz" wrap="square" lIns="247650" tIns="123825" rIns="247650" bIns="123825" numCol="1" spcCol="1270" anchor="ctr" anchorCtr="0">
           <a:noAutofit/>
         </a:bodyPr>
         <a:lstStyle/>
         <a:p>
-          <a:pPr marL="57150" lvl="1" indent="-57150" algn="l" defTabSz="400050">
+          <a:pPr marL="228600" lvl="1" indent="-228600" algn="l" defTabSz="889000">
             <a:lnSpc>
               <a:spcPct val="90000"/>
             </a:lnSpc>
@@ -1511,34 +1568,34 @@
             <a:buChar char="•"/>
           </a:pPr>
           <a:r>
-            <a:rPr lang="en-US" sz="900" kern="1200"/>
+            <a:rPr lang="en-US" sz="2000" kern="1200" dirty="0"/>
             <a:t>How does the position of learned/high scoring students affect the learning rate of the class?</a:t>
           </a:r>
         </a:p>
       </dsp:txBody>
-      <dsp:txXfrm>
-        <a:off x="0" y="2629138"/>
-        <a:ext cx="6797675" cy="382725"/>
+      <dsp:txXfrm rot="-5400000">
+        <a:off x="3621024" y="1452639"/>
+        <a:ext cx="6389727" cy="880800"/>
       </dsp:txXfrm>
     </dsp:sp>
-    <dsp:sp modelId="{2F9EE3F9-E6FE-4FFD-AD68-7BCA0A9640CE}">
+    <dsp:sp modelId="{10DBD6BB-2828-4E12-86ED-7E8F17A33928}">
       <dsp:nvSpPr>
         <dsp:cNvPr id="0" name=""/>
         <dsp:cNvSpPr/>
       </dsp:nvSpPr>
       <dsp:spPr>
         <a:xfrm>
-          <a:off x="339883" y="2496298"/>
-          <a:ext cx="4758372" cy="265680"/>
+          <a:off x="0" y="1282978"/>
+          <a:ext cx="3621024" cy="1220123"/>
         </a:xfrm>
         <a:prstGeom prst="roundRect">
           <a:avLst/>
         </a:prstGeom>
         <a:solidFill>
-          <a:schemeClr val="accent1">
-            <a:hueOff val="0"/>
-            <a:satOff val="0"/>
-            <a:lumOff val="0"/>
+          <a:schemeClr val="accent2">
+            <a:hueOff val="-665912"/>
+            <a:satOff val="-293"/>
+            <a:lumOff val="784"/>
             <a:alphaOff val="0"/>
           </a:schemeClr>
         </a:solidFill>
@@ -1570,12 +1627,12 @@
         </a:fontRef>
       </dsp:style>
       <dsp:txBody>
-        <a:bodyPr spcFirstLastPara="0" vert="horz" wrap="square" lIns="179855" tIns="0" rIns="179855" bIns="0" numCol="1" spcCol="1270" anchor="ctr" anchorCtr="0">
+        <a:bodyPr spcFirstLastPara="0" vert="horz" wrap="square" lIns="129540" tIns="64770" rIns="129540" bIns="64770" numCol="1" spcCol="1270" anchor="ctr" anchorCtr="0">
           <a:noAutofit/>
         </a:bodyPr>
         <a:lstStyle/>
         <a:p>
-          <a:pPr marL="0" lvl="0" indent="0" algn="l" defTabSz="400050">
+          <a:pPr marL="0" lvl="0" indent="0" algn="ctr" defTabSz="1511300">
             <a:lnSpc>
               <a:spcPct val="90000"/>
             </a:lnSpc>
@@ -1588,44 +1645,47 @@
             <a:buNone/>
           </a:pPr>
           <a:r>
-            <a:rPr lang="en-US" sz="900" kern="1200"/>
-            <a:t>Class’s dependence on the initial conditions of the system </a:t>
+            <a:rPr lang="en-US" sz="3400" kern="1200" dirty="0"/>
+            <a:t>Nucleation sites position</a:t>
           </a:r>
         </a:p>
       </dsp:txBody>
       <dsp:txXfrm>
-        <a:off x="352852" y="2509267"/>
-        <a:ext cx="4732434" cy="239742"/>
+        <a:off x="59561" y="1342539"/>
+        <a:ext cx="3501902" cy="1101001"/>
       </dsp:txXfrm>
     </dsp:sp>
-    <dsp:sp modelId="{F9156637-53A8-4970-8D11-430523CE1E85}">
+    <dsp:sp modelId="{DDEAD7B9-174E-4B85-9E31-C4487C5C4098}">
       <dsp:nvSpPr>
         <dsp:cNvPr id="0" name=""/>
         <dsp:cNvSpPr/>
       </dsp:nvSpPr>
       <dsp:spPr>
-        <a:xfrm>
-          <a:off x="0" y="3193303"/>
-          <a:ext cx="6797675" cy="524475"/>
+        <a:xfrm rot="5400000">
+          <a:off x="6351662" y="-44518"/>
+          <a:ext cx="976098" cy="6437376"/>
         </a:xfrm>
-        <a:prstGeom prst="rect">
+        <a:prstGeom prst="round2SameRect">
           <a:avLst/>
         </a:prstGeom>
         <a:solidFill>
-          <a:schemeClr val="lt1">
+          <a:schemeClr val="accent2">
+            <a:tint val="40000"/>
             <a:alpha val="90000"/>
-            <a:hueOff val="0"/>
-            <a:satOff val="0"/>
-            <a:lumOff val="0"/>
+            <a:hueOff val="-1857840"/>
+            <a:satOff val="3922"/>
+            <a:lumOff val="404"/>
             <a:alphaOff val="0"/>
           </a:schemeClr>
         </a:solidFill>
         <a:ln w="15875" cap="flat" cmpd="sng" algn="ctr">
           <a:solidFill>
-            <a:schemeClr val="accent1">
-              <a:hueOff val="0"/>
-              <a:satOff val="0"/>
-              <a:lumOff val="0"/>
+            <a:schemeClr val="accent2">
+              <a:tint val="40000"/>
+              <a:alpha val="90000"/>
+              <a:hueOff val="-1857840"/>
+              <a:satOff val="3922"/>
+              <a:lumOff val="404"/>
               <a:alphaOff val="0"/>
             </a:schemeClr>
           </a:solidFill>
@@ -1646,12 +1706,12 @@
         <a:fontRef idx="minor"/>
       </dsp:style>
       <dsp:txBody>
-        <a:bodyPr spcFirstLastPara="0" vert="horz" wrap="square" lIns="527575" tIns="187452" rIns="527575" bIns="64008" numCol="1" spcCol="1270" anchor="t" anchorCtr="0">
+        <a:bodyPr spcFirstLastPara="0" vert="horz" wrap="square" lIns="247650" tIns="123825" rIns="247650" bIns="123825" numCol="1" spcCol="1270" anchor="ctr" anchorCtr="0">
           <a:noAutofit/>
         </a:bodyPr>
         <a:lstStyle/>
         <a:p>
-          <a:pPr marL="57150" lvl="1" indent="-57150" algn="l" defTabSz="400050">
+          <a:pPr marL="171450" lvl="1" indent="-171450" algn="l" defTabSz="800100">
             <a:lnSpc>
               <a:spcPct val="90000"/>
             </a:lnSpc>
@@ -1664,12 +1724,12 @@
             <a:buChar char="•"/>
           </a:pPr>
           <a:r>
-            <a:rPr lang="en-US" sz="900" kern="1200"/>
+            <a:rPr lang="en-US" sz="1800" kern="1200" dirty="0"/>
             <a:t>How does the spatial aptitude homogeneity affect the learning rate of the class?</a:t>
           </a:r>
         </a:p>
         <a:p>
-          <a:pPr marL="57150" lvl="1" indent="-57150" algn="l" defTabSz="400050">
+          <a:pPr marL="171450" lvl="1" indent="-171450" algn="l" defTabSz="800100">
             <a:lnSpc>
               <a:spcPct val="90000"/>
             </a:lnSpc>
@@ -1682,34 +1742,42 @@
             <a:buChar char="•"/>
           </a:pPr>
           <a:r>
-            <a:rPr lang="en-US" sz="900" kern="1200"/>
-            <a:t>How does the social aspect affect the classroom (Watts–Strogatz model) dynamics</a:t>
+            <a:rPr lang="en-US" sz="1800" kern="1200" dirty="0"/>
+            <a:t>How does the social aspect affect the classroom (Watts–</a:t>
+          </a:r>
+          <a:r>
+            <a:rPr lang="en-US" sz="1800" kern="1200" dirty="0" err="1"/>
+            <a:t>Strogatz</a:t>
+          </a:r>
+          <a:r>
+            <a:rPr lang="en-US" sz="1800" kern="1200" dirty="0"/>
+            <a:t> model) dynamics</a:t>
           </a:r>
         </a:p>
       </dsp:txBody>
-      <dsp:txXfrm>
-        <a:off x="0" y="3193303"/>
-        <a:ext cx="6797675" cy="524475"/>
+      <dsp:txXfrm rot="-5400000">
+        <a:off x="3621024" y="2733769"/>
+        <a:ext cx="6389727" cy="880800"/>
       </dsp:txXfrm>
     </dsp:sp>
-    <dsp:sp modelId="{A0EBEC60-01D8-4B8F-9779-EC76D1742AC0}">
+    <dsp:sp modelId="{D498137B-4C1A-42E4-AAF6-2720CCB4BBB1}">
       <dsp:nvSpPr>
         <dsp:cNvPr id="0" name=""/>
         <dsp:cNvSpPr/>
       </dsp:nvSpPr>
       <dsp:spPr>
         <a:xfrm>
-          <a:off x="339883" y="3060463"/>
-          <a:ext cx="4758372" cy="265680"/>
+          <a:off x="0" y="2564107"/>
+          <a:ext cx="3621024" cy="1220123"/>
         </a:xfrm>
         <a:prstGeom prst="roundRect">
           <a:avLst/>
         </a:prstGeom>
         <a:solidFill>
-          <a:schemeClr val="accent1">
-            <a:hueOff val="0"/>
-            <a:satOff val="0"/>
-            <a:lumOff val="0"/>
+          <a:schemeClr val="accent2">
+            <a:hueOff val="-1331824"/>
+            <a:satOff val="-586"/>
+            <a:lumOff val="1569"/>
             <a:alphaOff val="0"/>
           </a:schemeClr>
         </a:solidFill>
@@ -1741,12 +1809,12 @@
         </a:fontRef>
       </dsp:style>
       <dsp:txBody>
-        <a:bodyPr spcFirstLastPara="0" vert="horz" wrap="square" lIns="179855" tIns="0" rIns="179855" bIns="0" numCol="1" spcCol="1270" anchor="ctr" anchorCtr="0">
+        <a:bodyPr spcFirstLastPara="0" vert="horz" wrap="square" lIns="129540" tIns="64770" rIns="129540" bIns="64770" numCol="1" spcCol="1270" anchor="ctr" anchorCtr="0">
           <a:noAutofit/>
         </a:bodyPr>
         <a:lstStyle/>
         <a:p>
-          <a:pPr marL="0" lvl="0" indent="0" algn="l" defTabSz="400050">
+          <a:pPr marL="0" lvl="0" indent="0" algn="ctr" defTabSz="1511300">
             <a:lnSpc>
               <a:spcPct val="90000"/>
             </a:lnSpc>
@@ -1759,14 +1827,14 @@
             <a:buNone/>
           </a:pPr>
           <a:r>
-            <a:rPr lang="en-US" sz="900" kern="1200"/>
-            <a:t>Neighborhood combination based on the aptitude of the students in the neighborhood</a:t>
+            <a:rPr lang="en-US" sz="3400" kern="1200" dirty="0"/>
+            <a:t>Homogeneity</a:t>
           </a:r>
         </a:p>
       </dsp:txBody>
       <dsp:txXfrm>
-        <a:off x="352852" y="3073432"/>
-        <a:ext cx="4732434" cy="239742"/>
+        <a:off x="59561" y="2623668"/>
+        <a:ext cx="3501902" cy="1101001"/>
       </dsp:txXfrm>
     </dsp:sp>
   </dsp:spTree>
@@ -1774,11 +1842,12 @@
 </file>
 
 <file path=ppt/diagrams/layout1.xml><?xml version="1.0" encoding="utf-8"?>
-<dgm:layoutDef xmlns:dgm="http://schemas.openxmlformats.org/drawingml/2006/diagram" xmlns:a="http://schemas.openxmlformats.org/drawingml/2006/main" uniqueId="urn:microsoft.com/office/officeart/2005/8/layout/list1">
+<dgm:layoutDef xmlns:dgm="http://schemas.openxmlformats.org/drawingml/2006/diagram" xmlns:a="http://schemas.openxmlformats.org/drawingml/2006/main" uniqueId="urn:microsoft.com/office/officeart/2005/8/layout/vList5">
   <dgm:title val=""/>
   <dgm:desc val=""/>
   <dgm:catLst>
-    <dgm:cat type="list" pri="4000"/>
+    <dgm:cat type="list" pri="15000"/>
+    <dgm:cat type="convert" pri="2000"/>
   </dgm:catLst>
   <dgm:sampData>
     <dgm:dataModel>
@@ -1787,10 +1856,28 @@
         <dgm:pt modelId="1">
           <dgm:prSet phldr="1"/>
         </dgm:pt>
+        <dgm:pt modelId="11">
+          <dgm:prSet phldr="1"/>
+        </dgm:pt>
+        <dgm:pt modelId="12">
+          <dgm:prSet phldr="1"/>
+        </dgm:pt>
         <dgm:pt modelId="2">
           <dgm:prSet phldr="1"/>
         </dgm:pt>
+        <dgm:pt modelId="21">
+          <dgm:prSet phldr="1"/>
+        </dgm:pt>
+        <dgm:pt modelId="22">
+          <dgm:prSet phldr="1"/>
+        </dgm:pt>
         <dgm:pt modelId="3">
+          <dgm:prSet phldr="1"/>
+        </dgm:pt>
+        <dgm:pt modelId="31">
+          <dgm:prSet phldr="1"/>
+        </dgm:pt>
+        <dgm:pt modelId="32">
           <dgm:prSet phldr="1"/>
         </dgm:pt>
       </dgm:ptLst>
@@ -1798,6 +1885,12 @@
         <dgm:cxn modelId="4" srcId="0" destId="1" srcOrd="0" destOrd="0"/>
         <dgm:cxn modelId="5" srcId="0" destId="2" srcOrd="1" destOrd="0"/>
         <dgm:cxn modelId="6" srcId="0" destId="3" srcOrd="2" destOrd="0"/>
+        <dgm:cxn modelId="13" srcId="1" destId="11" srcOrd="0" destOrd="0"/>
+        <dgm:cxn modelId="14" srcId="1" destId="12" srcOrd="1" destOrd="0"/>
+        <dgm:cxn modelId="23" srcId="2" destId="21" srcOrd="0" destOrd="0"/>
+        <dgm:cxn modelId="24" srcId="2" destId="22" srcOrd="1" destOrd="0"/>
+        <dgm:cxn modelId="33" srcId="3" destId="31" srcOrd="0" destOrd="0"/>
+        <dgm:cxn modelId="34" srcId="3" destId="32" srcOrd="1" destOrd="0"/>
       </dgm:cxnLst>
       <dgm:bg/>
       <dgm:whole/>
@@ -1808,11 +1901,15 @@
       <dgm:ptLst>
         <dgm:pt modelId="0" type="doc"/>
         <dgm:pt modelId="1"/>
+        <dgm:pt modelId="11"/>
         <dgm:pt modelId="2"/>
+        <dgm:pt modelId="21"/>
       </dgm:ptLst>
       <dgm:cxnLst>
         <dgm:cxn modelId="4" srcId="0" destId="1" srcOrd="0" destOrd="0"/>
         <dgm:cxn modelId="5" srcId="0" destId="2" srcOrd="1" destOrd="0"/>
+        <dgm:cxn modelId="13" srcId="1" destId="11" srcOrd="0" destOrd="0"/>
+        <dgm:cxn modelId="23" srcId="2" destId="21" srcOrd="0" destOrd="0"/>
       </dgm:cxnLst>
       <dgm:bg/>
       <dgm:whole/>
@@ -1823,40 +1920,44 @@
       <dgm:ptLst>
         <dgm:pt modelId="0" type="doc"/>
         <dgm:pt modelId="1"/>
+        <dgm:pt modelId="11"/>
         <dgm:pt modelId="2"/>
+        <dgm:pt modelId="21"/>
         <dgm:pt modelId="3"/>
+        <dgm:pt modelId="31"/>
         <dgm:pt modelId="4"/>
+        <dgm:pt modelId="41"/>
       </dgm:ptLst>
       <dgm:cxnLst>
         <dgm:cxn modelId="5" srcId="0" destId="1" srcOrd="0" destOrd="0"/>
         <dgm:cxn modelId="6" srcId="0" destId="2" srcOrd="1" destOrd="0"/>
         <dgm:cxn modelId="7" srcId="0" destId="3" srcOrd="2" destOrd="0"/>
         <dgm:cxn modelId="8" srcId="0" destId="4" srcOrd="3" destOrd="0"/>
+        <dgm:cxn modelId="13" srcId="1" destId="11" srcOrd="0" destOrd="0"/>
+        <dgm:cxn modelId="23" srcId="2" destId="21" srcOrd="0" destOrd="0"/>
+        <dgm:cxn modelId="33" srcId="3" destId="31" srcOrd="0" destOrd="0"/>
+        <dgm:cxn modelId="43" srcId="4" destId="41" srcOrd="0" destOrd="0"/>
       </dgm:cxnLst>
       <dgm:bg/>
       <dgm:whole/>
     </dgm:dataModel>
   </dgm:clrData>
-  <dgm:layoutNode name="linear">
+  <dgm:layoutNode name="Name0">
     <dgm:varLst>
       <dgm:dir/>
       <dgm:animLvl val="lvl"/>
       <dgm:resizeHandles val="exact"/>
     </dgm:varLst>
-    <dgm:choose name="Name0">
-      <dgm:if name="Name1" func="var" arg="dir" op="equ" val="norm">
+    <dgm:choose name="Name1">
+      <dgm:if name="Name2" func="var" arg="dir" op="equ" val="norm">
         <dgm:alg type="lin">
           <dgm:param type="linDir" val="fromT"/>
-          <dgm:param type="vertAlign" val="mid"/>
-          <dgm:param type="horzAlign" val="l"/>
           <dgm:param type="nodeHorzAlign" val="l"/>
         </dgm:alg>
       </dgm:if>
-      <dgm:else name="Name2">
+      <dgm:else name="Name3">
         <dgm:alg type="lin">
           <dgm:param type="linDir" val="fromT"/>
-          <dgm:param type="vertAlign" val="mid"/>
-          <dgm:param type="horzAlign" val="r"/>
           <dgm:param type="nodeHorzAlign" val="r"/>
         </dgm:alg>
       </dgm:else>
@@ -1866,45 +1967,24 @@
     </dgm:shape>
     <dgm:presOf/>
     <dgm:constrLst>
-      <dgm:constr type="w" for="ch" forName="parentLin" refType="w"/>
-      <dgm:constr type="h" for="ch" forName="parentLin" val="INF"/>
-      <dgm:constr type="w" for="des" forName="parentLeftMargin" refType="w" fact="0.05"/>
-      <dgm:constr type="w" for="des" forName="parentText" refType="w" fact="0.7"/>
-      <dgm:constr type="h" for="des" forName="parentText" refType="primFontSz" refFor="des" refForName="parentText" fact="0.82"/>
-      <dgm:constr type="h" for="ch" forName="negativeSpace" refType="primFontSz" refFor="des" refForName="parentText" fact="-0.41"/>
-      <dgm:constr type="h" for="ch" forName="negativeSpace" refType="h" refFor="des" refForName="parentText" op="lte" fact="-0.82"/>
-      <dgm:constr type="h" for="ch" forName="negativeSpace" refType="h" refFor="des" refForName="parentText" op="gte" fact="-0.82"/>
-      <dgm:constr type="w" for="ch" forName="childText" refType="w"/>
-      <dgm:constr type="h" for="ch" forName="childText" refType="primFontSz" refFor="des" refForName="parentText" fact="0.7"/>
-      <dgm:constr type="primFontSz" for="des" forName="parentText" val="65"/>
-      <dgm:constr type="primFontSz" for="ch" forName="childText" refType="primFontSz" refFor="des" refForName="parentText"/>
-      <dgm:constr type="tMarg" for="ch" forName="childText" refType="primFontSz" refFor="des" refForName="parentText" fact="1.64"/>
-      <dgm:constr type="tMarg" for="ch" forName="childText" refType="h" refFor="des" refForName="parentText" op="lte" fact="3.28"/>
-      <dgm:constr type="tMarg" for="ch" forName="childText" refType="h" refFor="des" refForName="parentText" op="gte" fact="3.28"/>
-      <dgm:constr type="lMarg" for="ch" forName="childText" refType="w" fact="0.22"/>
-      <dgm:constr type="rMarg" for="ch" forName="childText" refType="lMarg" refFor="ch" refForName="childText"/>
-      <dgm:constr type="lMarg" for="des" forName="parentText" refType="w" fact="0.075"/>
-      <dgm:constr type="rMarg" for="des" forName="parentText" refType="lMarg" refFor="des" refForName="parentText"/>
-      <dgm:constr type="h" for="ch" forName="spaceBetweenRectangles" refType="primFontSz" refFor="des" refForName="parentText" fact="0.15"/>
+      <dgm:constr type="h" for="ch" forName="linNode" refType="h"/>
+      <dgm:constr type="w" for="ch" forName="linNode" refType="w"/>
+      <dgm:constr type="h" for="ch" forName="sp" refType="h" fact="0.05"/>
+      <dgm:constr type="primFontSz" for="des" forName="parentText" op="equ" val="65"/>
+      <dgm:constr type="secFontSz" for="des" forName="descendantText" op="equ"/>
     </dgm:constrLst>
-    <dgm:ruleLst>
-      <dgm:rule type="primFontSz" for="des" forName="parentText" val="5" fact="NaN" max="NaN"/>
-    </dgm:ruleLst>
-    <dgm:forEach name="Name3" axis="ch" ptType="node">
-      <dgm:layoutNode name="parentLin">
-        <dgm:choose name="Name4">
-          <dgm:if name="Name5" func="var" arg="dir" op="equ" val="norm">
+    <dgm:ruleLst/>
+    <dgm:forEach name="Name4" axis="ch" ptType="node">
+      <dgm:layoutNode name="linNode">
+        <dgm:choose name="Name5">
+          <dgm:if name="Name6" func="var" arg="dir" op="equ" val="norm">
             <dgm:alg type="lin">
               <dgm:param type="linDir" val="fromL"/>
-              <dgm:param type="horzAlign" val="l"/>
-              <dgm:param type="nodeHorzAlign" val="l"/>
             </dgm:alg>
           </dgm:if>
-          <dgm:else name="Name6">
+          <dgm:else name="Name7">
             <dgm:alg type="lin">
               <dgm:param type="linDir" val="fromR"/>
-              <dgm:param type="horzAlign" val="r"/>
-              <dgm:param type="nodeHorzAlign" val="r"/>
             </dgm:alg>
           </dgm:else>
         </dgm:choose>
@@ -1912,78 +1992,74 @@
           <dgm:adjLst/>
         </dgm:shape>
         <dgm:presOf/>
-        <dgm:constrLst/>
+        <dgm:constrLst>
+          <dgm:constr type="w" for="ch" forName="parentText" refType="w" fact="0.36"/>
+          <dgm:constr type="w" for="ch" forName="descendantText" refType="w" fact="0.64"/>
+          <dgm:constr type="h" for="ch" forName="parentText" refType="h"/>
+          <dgm:constr type="h" for="ch" forName="descendantText" refType="h" refFor="ch" refForName="parentText" fact="0.8"/>
+        </dgm:constrLst>
         <dgm:ruleLst/>
-        <dgm:layoutNode name="parentLeftMargin">
-          <dgm:alg type="sp"/>
-          <dgm:shape xmlns:r="http://schemas.openxmlformats.org/officeDocument/2006/relationships" type="rect" r:blip="" hideGeom="1">
-            <dgm:adjLst/>
-          </dgm:shape>
-          <dgm:presOf axis="self"/>
-          <dgm:constrLst>
-            <dgm:constr type="h"/>
-          </dgm:constrLst>
-          <dgm:ruleLst/>
-        </dgm:layoutNode>
-        <dgm:layoutNode name="parentText" styleLbl="node1">
+        <dgm:layoutNode name="parentText">
           <dgm:varLst>
-            <dgm:chMax val="0"/>
+            <dgm:chMax val="1"/>
             <dgm:bulletEnabled val="1"/>
           </dgm:varLst>
-          <dgm:choose name="Name7">
-            <dgm:if name="Name8" func="var" arg="dir" op="equ" val="norm">
-              <dgm:alg type="tx">
-                <dgm:param type="parTxLTRAlign" val="l"/>
-                <dgm:param type="parTxRTLAlign" val="l"/>
-              </dgm:alg>
-            </dgm:if>
-            <dgm:else name="Name9">
-              <dgm:alg type="tx">
-                <dgm:param type="parTxLTRAlign" val="r"/>
-                <dgm:param type="parTxRTLAlign" val="r"/>
-              </dgm:alg>
-            </dgm:else>
-          </dgm:choose>
-          <dgm:shape xmlns:r="http://schemas.openxmlformats.org/officeDocument/2006/relationships" type="roundRect" r:blip="">
+          <dgm:alg type="tx"/>
+          <dgm:shape xmlns:r="http://schemas.openxmlformats.org/officeDocument/2006/relationships" type="roundRect" r:blip="" zOrderOff="3">
             <dgm:adjLst/>
           </dgm:shape>
           <dgm:presOf axis="self" ptType="node"/>
           <dgm:constrLst>
-            <dgm:constr type="tMarg"/>
-            <dgm:constr type="bMarg"/>
+            <dgm:constr type="tMarg" refType="primFontSz" fact="0.15"/>
+            <dgm:constr type="bMarg" refType="primFontSz" fact="0.15"/>
+            <dgm:constr type="lMarg" refType="primFontSz" fact="0.3"/>
+            <dgm:constr type="rMarg" refType="primFontSz" fact="0.3"/>
           </dgm:constrLst>
-          <dgm:ruleLst/>
+          <dgm:ruleLst>
+            <dgm:rule type="primFontSz" val="5" fact="NaN" max="NaN"/>
+          </dgm:ruleLst>
         </dgm:layoutNode>
+        <dgm:choose name="Name8">
+          <dgm:if name="Name9" axis="ch" ptType="node" func="cnt" op="gte" val="1">
+            <dgm:layoutNode name="descendantText" styleLbl="alignAccFollowNode1">
+              <dgm:varLst>
+                <dgm:bulletEnabled val="1"/>
+              </dgm:varLst>
+              <dgm:alg type="tx">
+                <dgm:param type="stBulletLvl" val="1"/>
+                <dgm:param type="txAnchorVertCh" val="mid"/>
+              </dgm:alg>
+              <dgm:choose name="Name10">
+                <dgm:if name="Name11" func="var" arg="dir" op="equ" val="norm">
+                  <dgm:shape xmlns:r="http://schemas.openxmlformats.org/officeDocument/2006/relationships" rot="90" type="round2SameRect" r:blip="">
+                    <dgm:adjLst/>
+                  </dgm:shape>
+                </dgm:if>
+                <dgm:else name="Name12">
+                  <dgm:shape xmlns:r="http://schemas.openxmlformats.org/officeDocument/2006/relationships" rot="-90" type="round2SameRect" r:blip="">
+                    <dgm:adjLst/>
+                  </dgm:shape>
+                </dgm:else>
+              </dgm:choose>
+              <dgm:presOf axis="des" ptType="node"/>
+              <dgm:constrLst>
+                <dgm:constr type="secFontSz" val="65"/>
+                <dgm:constr type="primFontSz" refType="secFontSz"/>
+                <dgm:constr type="lMarg" refType="secFontSz" fact="0.3"/>
+                <dgm:constr type="rMarg" refType="secFontSz" fact="0.3"/>
+                <dgm:constr type="tMarg" refType="secFontSz" fact="0.15"/>
+                <dgm:constr type="bMarg" refType="secFontSz" fact="0.15"/>
+              </dgm:constrLst>
+              <dgm:ruleLst>
+                <dgm:rule type="secFontSz" val="5" fact="NaN" max="NaN"/>
+              </dgm:ruleLst>
+            </dgm:layoutNode>
+          </dgm:if>
+          <dgm:else name="Name13"/>
+        </dgm:choose>
       </dgm:layoutNode>
-      <dgm:layoutNode name="negativeSpace">
-        <dgm:alg type="sp"/>
-        <dgm:shape xmlns:r="http://schemas.openxmlformats.org/officeDocument/2006/relationships" r:blip="">
-          <dgm:adjLst/>
-        </dgm:shape>
-        <dgm:presOf/>
-        <dgm:constrLst/>
-        <dgm:ruleLst/>
-      </dgm:layoutNode>
-      <dgm:layoutNode name="childText" styleLbl="conFgAcc1">
-        <dgm:varLst>
-          <dgm:bulletEnabled val="1"/>
-        </dgm:varLst>
-        <dgm:alg type="tx">
-          <dgm:param type="stBulletLvl" val="1"/>
-        </dgm:alg>
-        <dgm:shape xmlns:r="http://schemas.openxmlformats.org/officeDocument/2006/relationships" type="rect" r:blip="" zOrderOff="-2">
-          <dgm:adjLst/>
-        </dgm:shape>
-        <dgm:presOf axis="des" ptType="node"/>
-        <dgm:constrLst>
-          <dgm:constr type="secFontSz" refType="primFontSz"/>
-        </dgm:constrLst>
-        <dgm:ruleLst>
-          <dgm:rule type="h" val="INF" fact="NaN" max="NaN"/>
-        </dgm:ruleLst>
-      </dgm:layoutNode>
-      <dgm:forEach name="Name10" axis="followSib" ptType="sibTrans" cnt="1">
-        <dgm:layoutNode name="spaceBetweenRectangles">
+      <dgm:forEach name="Name14" axis="followSib" ptType="sibTrans" cnt="1">
+        <dgm:layoutNode name="sp">
           <dgm:alg type="sp"/>
           <dgm:shape xmlns:r="http://schemas.openxmlformats.org/officeDocument/2006/relationships" r:blip="">
             <dgm:adjLst/>
@@ -3380,6 +3456,523 @@
     </a:lvl9pPr>
   </p:notesStyle>
 </p:notesMaster>
+</file>
+
+<file path=ppt/notesSlides/notesSlide1.xml><?xml version="1.0" encoding="utf-8"?>
+<p:notes xmlns:a="http://schemas.openxmlformats.org/drawingml/2006/main" xmlns:r="http://schemas.openxmlformats.org/officeDocument/2006/relationships" xmlns:p="http://schemas.openxmlformats.org/presentationml/2006/main">
+  <p:cSld>
+    <p:spTree>
+      <p:nvGrpSpPr>
+        <p:cNvPr id="1" name=""/>
+        <p:cNvGrpSpPr/>
+        <p:nvPr/>
+      </p:nvGrpSpPr>
+      <p:grpSpPr>
+        <a:xfrm>
+          <a:off x="0" y="0"/>
+          <a:ext cx="0" cy="0"/>
+          <a:chOff x="0" y="0"/>
+          <a:chExt cx="0" cy="0"/>
+        </a:xfrm>
+      </p:grpSpPr>
+      <p:sp>
+        <p:nvSpPr>
+          <p:cNvPr id="2" name="Slide Image Placeholder 1"/>
+          <p:cNvSpPr>
+            <a:spLocks noGrp="1" noRot="1" noChangeAspect="1"/>
+          </p:cNvSpPr>
+          <p:nvPr>
+            <p:ph type="sldImg"/>
+          </p:nvPr>
+        </p:nvSpPr>
+        <p:spPr/>
+      </p:sp>
+      <p:sp>
+        <p:nvSpPr>
+          <p:cNvPr id="3" name="Notes Placeholder 2"/>
+          <p:cNvSpPr>
+            <a:spLocks noGrp="1"/>
+          </p:cNvSpPr>
+          <p:nvPr>
+            <p:ph type="body" idx="1"/>
+          </p:nvPr>
+        </p:nvSpPr>
+        <p:spPr/>
+        <p:txBody>
+          <a:bodyPr/>
+          <a:lstStyle/>
+          <a:p>
+            <a:pPr lvl="1"/>
+            <a:r>
+              <a:rPr lang="en-PH" dirty="0"/>
+              <a:t>Uses a neural network to predict the outcome of the classroom based on the initial seating arrangement and aptitude levels of the students</a:t>
+            </a:r>
+          </a:p>
+        </p:txBody>
+      </p:sp>
+      <p:sp>
+        <p:nvSpPr>
+          <p:cNvPr id="4" name="Slide Number Placeholder 3"/>
+          <p:cNvSpPr>
+            <a:spLocks noGrp="1"/>
+          </p:cNvSpPr>
+          <p:nvPr>
+            <p:ph type="sldNum" sz="quarter" idx="5"/>
+          </p:nvPr>
+        </p:nvSpPr>
+        <p:spPr/>
+        <p:txBody>
+          <a:bodyPr/>
+          <a:lstStyle/>
+          <a:p>
+            <a:fld id="{0805B9C7-E64D-4A9E-9341-1BC2A2DA8DCC}" type="slidenum">
+              <a:rPr lang="en-PH" smtClean="0"/>
+              <a:t>3</a:t>
+            </a:fld>
+            <a:endParaRPr lang="en-PH"/>
+          </a:p>
+        </p:txBody>
+      </p:sp>
+    </p:spTree>
+    <p:extLst>
+      <p:ext uri="{BB962C8B-B14F-4D97-AF65-F5344CB8AC3E}">
+        <p14:creationId xmlns:p14="http://schemas.microsoft.com/office/powerpoint/2010/main" val="1799052199"/>
+      </p:ext>
+    </p:extLst>
+  </p:cSld>
+  <p:clrMapOvr>
+    <a:masterClrMapping/>
+  </p:clrMapOvr>
+</p:notes>
+</file>
+
+<file path=ppt/notesSlides/notesSlide2.xml><?xml version="1.0" encoding="utf-8"?>
+<p:notes xmlns:a="http://schemas.openxmlformats.org/drawingml/2006/main" xmlns:r="http://schemas.openxmlformats.org/officeDocument/2006/relationships" xmlns:p="http://schemas.openxmlformats.org/presentationml/2006/main">
+  <p:cSld>
+    <p:spTree>
+      <p:nvGrpSpPr>
+        <p:cNvPr id="1" name=""/>
+        <p:cNvGrpSpPr/>
+        <p:nvPr/>
+      </p:nvGrpSpPr>
+      <p:grpSpPr>
+        <a:xfrm>
+          <a:off x="0" y="0"/>
+          <a:ext cx="0" cy="0"/>
+          <a:chOff x="0" y="0"/>
+          <a:chExt cx="0" cy="0"/>
+        </a:xfrm>
+      </p:grpSpPr>
+      <p:sp>
+        <p:nvSpPr>
+          <p:cNvPr id="2" name="Slide Image Placeholder 1"/>
+          <p:cNvSpPr>
+            <a:spLocks noGrp="1" noRot="1" noChangeAspect="1"/>
+          </p:cNvSpPr>
+          <p:nvPr>
+            <p:ph type="sldImg"/>
+          </p:nvPr>
+        </p:nvSpPr>
+        <p:spPr/>
+      </p:sp>
+      <p:sp>
+        <p:nvSpPr>
+          <p:cNvPr id="3" name="Notes Placeholder 2"/>
+          <p:cNvSpPr>
+            <a:spLocks noGrp="1"/>
+          </p:cNvSpPr>
+          <p:nvPr>
+            <p:ph type="body" idx="1"/>
+          </p:nvPr>
+        </p:nvSpPr>
+        <p:spPr/>
+        <p:txBody>
+          <a:bodyPr/>
+          <a:lstStyle/>
+          <a:p>
+            <a:endParaRPr lang="en-PH" dirty="0"/>
+          </a:p>
+        </p:txBody>
+      </p:sp>
+      <p:sp>
+        <p:nvSpPr>
+          <p:cNvPr id="4" name="Slide Number Placeholder 3"/>
+          <p:cNvSpPr>
+            <a:spLocks noGrp="1"/>
+          </p:cNvSpPr>
+          <p:nvPr>
+            <p:ph type="sldNum" sz="quarter" idx="5"/>
+          </p:nvPr>
+        </p:nvSpPr>
+        <p:spPr/>
+        <p:txBody>
+          <a:bodyPr/>
+          <a:lstStyle/>
+          <a:p>
+            <a:fld id="{0805B9C7-E64D-4A9E-9341-1BC2A2DA8DCC}" type="slidenum">
+              <a:rPr lang="en-PH" smtClean="0"/>
+              <a:t>4</a:t>
+            </a:fld>
+            <a:endParaRPr lang="en-PH"/>
+          </a:p>
+        </p:txBody>
+      </p:sp>
+    </p:spTree>
+    <p:extLst>
+      <p:ext uri="{BB962C8B-B14F-4D97-AF65-F5344CB8AC3E}">
+        <p14:creationId xmlns:p14="http://schemas.microsoft.com/office/powerpoint/2010/main" val="1027894524"/>
+      </p:ext>
+    </p:extLst>
+  </p:cSld>
+  <p:clrMapOvr>
+    <a:masterClrMapping/>
+  </p:clrMapOvr>
+</p:notes>
+</file>
+
+<file path=ppt/notesSlides/notesSlide3.xml><?xml version="1.0" encoding="utf-8"?>
+<p:notes xmlns:a="http://schemas.openxmlformats.org/drawingml/2006/main" xmlns:r="http://schemas.openxmlformats.org/officeDocument/2006/relationships" xmlns:p="http://schemas.openxmlformats.org/presentationml/2006/main">
+  <p:cSld>
+    <p:spTree>
+      <p:nvGrpSpPr>
+        <p:cNvPr id="1" name=""/>
+        <p:cNvGrpSpPr/>
+        <p:nvPr/>
+      </p:nvGrpSpPr>
+      <p:grpSpPr>
+        <a:xfrm>
+          <a:off x="0" y="0"/>
+          <a:ext cx="0" cy="0"/>
+          <a:chOff x="0" y="0"/>
+          <a:chExt cx="0" cy="0"/>
+        </a:xfrm>
+      </p:grpSpPr>
+      <p:sp>
+        <p:nvSpPr>
+          <p:cNvPr id="2" name="Slide Image Placeholder 1"/>
+          <p:cNvSpPr>
+            <a:spLocks noGrp="1" noRot="1" noChangeAspect="1"/>
+          </p:cNvSpPr>
+          <p:nvPr>
+            <p:ph type="sldImg"/>
+          </p:nvPr>
+        </p:nvSpPr>
+        <p:spPr/>
+      </p:sp>
+      <mc:AlternateContent xmlns:mc="http://schemas.openxmlformats.org/markup-compatibility/2006">
+        <mc:Choice xmlns:a14="http://schemas.microsoft.com/office/drawing/2010/main" Requires="a14">
+          <p:sp>
+            <p:nvSpPr>
+              <p:cNvPr id="3" name="Notes Placeholder 2"/>
+              <p:cNvSpPr>
+                <a:spLocks noGrp="1"/>
+              </p:cNvSpPr>
+              <p:nvPr>
+                <p:ph type="body" idx="1"/>
+              </p:nvPr>
+            </p:nvSpPr>
+            <p:spPr/>
+            <p:txBody>
+              <a:bodyPr/>
+              <a:lstStyle/>
+              <a:p>
+                <a:pPr>
+                  <a:lnSpc>
+                    <a:spcPct val="170000"/>
+                  </a:lnSpc>
+                </a:pPr>
+                <a:r>
+                  <a:rPr lang="en-PH" sz="2400" dirty="0"/>
+                  <a:t>Each student belongs to a 3x3 neighborhood </a:t>
+                </a:r>
+                <a14:m>
+                  <m:oMath xmlns:m="http://schemas.openxmlformats.org/officeDocument/2006/math">
+                    <m:r>
+                      <a:rPr lang="en-PH" sz="2400" b="0" i="1" smtClean="0">
+                        <a:latin typeface="Cambria Math" panose="02040503050406030204" pitchFamily="18" charset="0"/>
+                      </a:rPr>
+                      <m:t>𝑁</m:t>
+                    </m:r>
+                  </m:oMath>
+                </a14:m>
+                <a:r>
+                  <a:rPr lang="en-PH" sz="2400" dirty="0"/>
+                  <a:t> (Moore neighborhood) with a </a:t>
+                </a:r>
+                <a14:m>
+                  <m:oMath xmlns:m="http://schemas.openxmlformats.org/officeDocument/2006/math">
+                    <m:sSub>
+                      <m:sSubPr>
+                        <m:ctrlPr>
+                          <a:rPr lang="en-PH" sz="2400" b="0" i="1" smtClean="0">
+                            <a:latin typeface="Cambria Math" panose="02040503050406030204" pitchFamily="18" charset="0"/>
+                          </a:rPr>
+                        </m:ctrlPr>
+                      </m:sSubPr>
+                      <m:e>
+                        <m:r>
+                          <a:rPr lang="en-PH" sz="2400" b="0" i="1" smtClean="0">
+                            <a:latin typeface="Cambria Math" panose="02040503050406030204" pitchFamily="18" charset="0"/>
+                          </a:rPr>
+                          <m:t>𝜆</m:t>
+                        </m:r>
+                      </m:e>
+                      <m:sub>
+                        <m:r>
+                          <a:rPr lang="en-PH" sz="2400" b="0" i="1" smtClean="0">
+                            <a:latin typeface="Cambria Math" panose="02040503050406030204" pitchFamily="18" charset="0"/>
+                          </a:rPr>
+                          <m:t>𝑖</m:t>
+                        </m:r>
+                      </m:sub>
+                    </m:sSub>
+                  </m:oMath>
+                </a14:m>
+                <a:r>
+                  <a:rPr lang="en-PH" sz="2400" dirty="0"/>
+                  <a:t> chance from learning from their neighbors </a:t>
+                </a:r>
+                <a14:m>
+                  <m:oMath xmlns:m="http://schemas.openxmlformats.org/officeDocument/2006/math">
+                    <m:sSub>
+                      <m:sSubPr>
+                        <m:ctrlPr>
+                          <a:rPr lang="en-PH" sz="2400" b="0" i="1" smtClean="0">
+                            <a:latin typeface="Cambria Math" panose="02040503050406030204" pitchFamily="18" charset="0"/>
+                          </a:rPr>
+                        </m:ctrlPr>
+                      </m:sSubPr>
+                      <m:e>
+                        <m:r>
+                          <a:rPr lang="en-PH" sz="2400" b="0" i="1" smtClean="0">
+                            <a:latin typeface="Cambria Math" panose="02040503050406030204" pitchFamily="18" charset="0"/>
+                          </a:rPr>
+                          <m:t>𝑛</m:t>
+                        </m:r>
+                      </m:e>
+                      <m:sub>
+                        <m:r>
+                          <a:rPr lang="en-PH" sz="2400" b="0" i="1" smtClean="0">
+                            <a:latin typeface="Cambria Math" panose="02040503050406030204" pitchFamily="18" charset="0"/>
+                          </a:rPr>
+                          <m:t>𝑖</m:t>
+                        </m:r>
+                      </m:sub>
+                    </m:sSub>
+                  </m:oMath>
+                </a14:m>
+                <a:r>
+                  <a:rPr lang="en-PH" sz="2400" b="0" dirty="0"/>
+                  <a:t> with state </a:t>
+                </a:r>
+                <a14:m>
+                  <m:oMath xmlns:m="http://schemas.openxmlformats.org/officeDocument/2006/math">
+                    <m:sSub>
+                      <m:sSubPr>
+                        <m:ctrlPr>
+                          <a:rPr lang="en-PH" sz="2400" b="0" i="1" smtClean="0">
+                            <a:latin typeface="Cambria Math" panose="02040503050406030204" pitchFamily="18" charset="0"/>
+                          </a:rPr>
+                        </m:ctrlPr>
+                      </m:sSubPr>
+                      <m:e>
+                        <m:r>
+                          <a:rPr lang="en-PH" sz="2400" b="0" i="1" smtClean="0">
+                            <a:latin typeface="Cambria Math" panose="02040503050406030204" pitchFamily="18" charset="0"/>
+                          </a:rPr>
+                          <m:t>𝑆</m:t>
+                        </m:r>
+                      </m:e>
+                      <m:sub>
+                        <m:r>
+                          <a:rPr lang="en-PH" sz="2400" b="0" i="1" smtClean="0">
+                            <a:latin typeface="Cambria Math" panose="02040503050406030204" pitchFamily="18" charset="0"/>
+                          </a:rPr>
+                          <m:t>𝑖</m:t>
+                        </m:r>
+                      </m:sub>
+                    </m:sSub>
+                  </m:oMath>
+                </a14:m>
+                <a:endParaRPr lang="en-PH" sz="2400" b="0" dirty="0"/>
+              </a:p>
+              <a:p>
+                <a:pPr lvl="1">
+                  <a:lnSpc>
+                    <a:spcPct val="170000"/>
+                  </a:lnSpc>
+                </a:pPr>
+                <a:r>
+                  <a:rPr lang="en-PH" sz="2000" dirty="0"/>
+                  <a:t>Note: student of interest is set to be the center of the neighborhood (</a:t>
+                </a:r>
+                <a14:m>
+                  <m:oMath xmlns:m="http://schemas.openxmlformats.org/officeDocument/2006/math">
+                    <m:sSub>
+                      <m:sSubPr>
+                        <m:ctrlPr>
+                          <a:rPr lang="en-PH" sz="2000" b="0" i="1" smtClean="0">
+                            <a:latin typeface="Cambria Math" panose="02040503050406030204" pitchFamily="18" charset="0"/>
+                          </a:rPr>
+                        </m:ctrlPr>
+                      </m:sSubPr>
+                      <m:e>
+                        <m:r>
+                          <a:rPr lang="en-PH" sz="2000" b="0" i="1" smtClean="0">
+                            <a:latin typeface="Cambria Math" panose="02040503050406030204" pitchFamily="18" charset="0"/>
+                          </a:rPr>
+                          <m:t>𝑛</m:t>
+                        </m:r>
+                      </m:e>
+                      <m:sub>
+                        <m:r>
+                          <a:rPr lang="en-PH" sz="2000" b="0" i="1" smtClean="0">
+                            <a:latin typeface="Cambria Math" panose="02040503050406030204" pitchFamily="18" charset="0"/>
+                          </a:rPr>
+                          <m:t>5</m:t>
+                        </m:r>
+                      </m:sub>
+                    </m:sSub>
+                  </m:oMath>
+                </a14:m>
+                <a:r>
+                  <a:rPr lang="en-PH" sz="2000" b="0" dirty="0"/>
+                  <a:t>)</a:t>
+                </a:r>
+                <a:endParaRPr lang="en-PH" dirty="0"/>
+              </a:p>
+              <a:p>
+                <a:endParaRPr lang="en-PH" dirty="0"/>
+              </a:p>
+            </p:txBody>
+          </p:sp>
+        </mc:Choice>
+        <mc:Fallback>
+          <p:sp>
+            <p:nvSpPr>
+              <p:cNvPr id="3" name="Notes Placeholder 2"/>
+              <p:cNvSpPr>
+                <a:spLocks noGrp="1"/>
+              </p:cNvSpPr>
+              <p:nvPr>
+                <p:ph type="body" idx="1"/>
+              </p:nvPr>
+            </p:nvSpPr>
+            <p:spPr/>
+            <p:txBody>
+              <a:bodyPr/>
+              <a:lstStyle/>
+              <a:p>
+                <a:pPr>
+                  <a:lnSpc>
+                    <a:spcPct val="170000"/>
+                  </a:lnSpc>
+                </a:pPr>
+                <a:r>
+                  <a:rPr lang="en-PH" sz="2400" dirty="0"/>
+                  <a:t>Each student belongs to a 3x3 neighborhood </a:t>
+                </a:r>
+                <a:r>
+                  <a:rPr lang="en-PH" sz="2400" b="0" i="0">
+                    <a:latin typeface="Cambria Math" panose="02040503050406030204" pitchFamily="18" charset="0"/>
+                  </a:rPr>
+                  <a:t>𝑁</a:t>
+                </a:r>
+                <a:r>
+                  <a:rPr lang="en-PH" sz="2400" dirty="0"/>
+                  <a:t> (Moore neighborhood) with a </a:t>
+                </a:r>
+                <a:r>
+                  <a:rPr lang="en-PH" sz="2400" b="0" i="0">
+                    <a:latin typeface="Cambria Math" panose="02040503050406030204" pitchFamily="18" charset="0"/>
+                  </a:rPr>
+                  <a:t>𝜆_𝑖</a:t>
+                </a:r>
+                <a:r>
+                  <a:rPr lang="en-PH" sz="2400" dirty="0"/>
+                  <a:t> chance from learning from their neighbors </a:t>
+                </a:r>
+                <a:r>
+                  <a:rPr lang="en-PH" sz="2400" b="0" i="0">
+                    <a:latin typeface="Cambria Math" panose="02040503050406030204" pitchFamily="18" charset="0"/>
+                  </a:rPr>
+                  <a:t>𝑛_𝑖</a:t>
+                </a:r>
+                <a:r>
+                  <a:rPr lang="en-PH" sz="2400" b="0" dirty="0"/>
+                  <a:t> with state </a:t>
+                </a:r>
+                <a:r>
+                  <a:rPr lang="en-PH" sz="2400" b="0" i="0">
+                    <a:latin typeface="Cambria Math" panose="02040503050406030204" pitchFamily="18" charset="0"/>
+                  </a:rPr>
+                  <a:t>𝑆_𝑖</a:t>
+                </a:r>
+                <a:endParaRPr lang="en-PH" sz="2400" b="0" dirty="0"/>
+              </a:p>
+              <a:p>
+                <a:pPr lvl="1">
+                  <a:lnSpc>
+                    <a:spcPct val="170000"/>
+                  </a:lnSpc>
+                </a:pPr>
+                <a:r>
+                  <a:rPr lang="en-PH" sz="2000" dirty="0"/>
+                  <a:t>Note: student of interest is set to be the center of the neighborhood (</a:t>
+                </a:r>
+                <a:r>
+                  <a:rPr lang="en-PH" sz="2000" b="0" i="0">
+                    <a:latin typeface="Cambria Math" panose="02040503050406030204" pitchFamily="18" charset="0"/>
+                  </a:rPr>
+                  <a:t>𝑛_5</a:t>
+                </a:r>
+                <a:r>
+                  <a:rPr lang="en-PH" sz="2000" b="0" dirty="0"/>
+                  <a:t>)</a:t>
+                </a:r>
+                <a:endParaRPr lang="en-PH" dirty="0"/>
+              </a:p>
+              <a:p>
+                <a:endParaRPr lang="en-PH" dirty="0"/>
+              </a:p>
+            </p:txBody>
+          </p:sp>
+        </mc:Fallback>
+      </mc:AlternateContent>
+      <p:sp>
+        <p:nvSpPr>
+          <p:cNvPr id="4" name="Slide Number Placeholder 3"/>
+          <p:cNvSpPr>
+            <a:spLocks noGrp="1"/>
+          </p:cNvSpPr>
+          <p:nvPr>
+            <p:ph type="sldNum" sz="quarter" idx="5"/>
+          </p:nvPr>
+        </p:nvSpPr>
+        <p:spPr/>
+        <p:txBody>
+          <a:bodyPr/>
+          <a:lstStyle/>
+          <a:p>
+            <a:fld id="{0805B9C7-E64D-4A9E-9341-1BC2A2DA8DCC}" type="slidenum">
+              <a:rPr lang="en-PH" smtClean="0"/>
+              <a:t>5</a:t>
+            </a:fld>
+            <a:endParaRPr lang="en-PH"/>
+          </a:p>
+        </p:txBody>
+      </p:sp>
+    </p:spTree>
+    <p:extLst>
+      <p:ext uri="{BB962C8B-B14F-4D97-AF65-F5344CB8AC3E}">
+        <p14:creationId xmlns:p14="http://schemas.microsoft.com/office/powerpoint/2010/main" val="3727483927"/>
+      </p:ext>
+    </p:extLst>
+  </p:cSld>
+  <p:clrMapOvr>
+    <a:masterClrMapping/>
+  </p:clrMapOvr>
+</p:notes>
 </file>
 
 <file path=ppt/slideLayouts/slideLayout1.xml><?xml version="1.0" encoding="utf-8"?>
@@ -7151,41 +7744,54 @@
         </p:spPr>
         <p:txBody>
           <a:bodyPr>
-            <a:normAutofit/>
+            <a:normAutofit fontScale="77500" lnSpcReduction="20000"/>
           </a:bodyPr>
           <a:lstStyle/>
           <a:p>
             <a:r>
               <a:rPr lang="en-PH" b="1" dirty="0"/>
-              <a:t>SY, clarence Ioakim t</a:t>
+              <a:t>clarence Ioakim t</a:t>
             </a:r>
             <a:r>
               <a:rPr lang="en-PH" dirty="0"/>
-              <a:t>. (BS 4)</a:t>
+              <a:t>. </a:t>
             </a:r>
-          </a:p>
-          <a:p>
             <a:r>
               <a:rPr lang="en-PH" b="1" dirty="0"/>
+              <a:t>SY </a:t>
+            </a:r>
+          </a:p>
+          <a:p>
+            <a:r>
+              <a:rPr lang="en-PH" dirty="0"/>
+              <a:t>BS4 Applied physics </a:t>
+            </a:r>
+          </a:p>
+          <a:p>
+            <a:endParaRPr lang="en-PH" dirty="0"/>
+          </a:p>
+          <a:p>
+            <a:r>
+              <a:rPr lang="en-PH" sz="2000" b="1" dirty="0"/>
               <a:t>Adviser: </a:t>
             </a:r>
             <a:r>
-              <a:rPr lang="en-PH" b="1" dirty="0" err="1"/>
+              <a:rPr lang="en-PH" sz="2000" b="1" dirty="0" err="1"/>
               <a:t>Johnrob</a:t>
             </a:r>
             <a:r>
-              <a:rPr lang="en-PH" b="1" dirty="0"/>
+              <a:rPr lang="en-PH" sz="2000" b="1" dirty="0"/>
               <a:t> y. </a:t>
             </a:r>
             <a:r>
-              <a:rPr lang="en-PH" b="1" dirty="0" err="1"/>
+              <a:rPr lang="en-PH" sz="2000" b="1" dirty="0" err="1"/>
               <a:t>Bantang</a:t>
             </a:r>
-            <a:endParaRPr lang="en-PH" b="1" dirty="0"/>
+            <a:endParaRPr lang="en-PH" sz="2000" b="1" dirty="0"/>
           </a:p>
           <a:p>
             <a:r>
-              <a:rPr lang="en-PH" dirty="0"/>
+              <a:rPr lang="en-PH" sz="2000" dirty="0"/>
               <a:t>Complexity science group</a:t>
             </a:r>
           </a:p>
@@ -7258,66 +7864,6 @@
           <a:chExt cx="0" cy="0"/>
         </a:xfrm>
       </p:grpSpPr>
-      <p:sp useBgFill="1">
-        <p:nvSpPr>
-          <p:cNvPr id="8" name="Rectangle 7">
-            <a:extLst>
-              <a:ext uri="{FF2B5EF4-FFF2-40B4-BE49-F238E27FC236}">
-                <a16:creationId xmlns:a16="http://schemas.microsoft.com/office/drawing/2014/main" id="{CECF0FC6-D57B-48B6-9036-F4FFD91A4B34}"/>
-              </a:ext>
-              <a:ext uri="{C183D7F6-B498-43B3-948B-1728B52AA6E4}">
-                <adec:decorative xmlns:adec="http://schemas.microsoft.com/office/drawing/2017/decorative" val="1"/>
-              </a:ext>
-            </a:extLst>
-          </p:cNvPr>
-          <p:cNvSpPr>
-            <a:spLocks noGrp="1" noRot="1" noChangeAspect="1" noMove="1" noResize="1" noEditPoints="1" noAdjustHandles="1" noChangeArrowheads="1" noChangeShapeType="1" noTextEdit="1"/>
-          </p:cNvSpPr>
-          <p:nvPr>
-            <p:extLst>
-              <p:ext uri="{386F3935-93C4-4BCD-93E2-E3B085C9AB24}">
-                <p16:designElem xmlns:p16="http://schemas.microsoft.com/office/powerpoint/2015/main" val="1"/>
-              </p:ext>
-            </p:extLst>
-          </p:nvPr>
-        </p:nvSpPr>
-        <p:spPr>
-          <a:xfrm>
-            <a:off x="0" y="0"/>
-            <a:ext cx="12186315" cy="6858000"/>
-          </a:xfrm>
-          <a:prstGeom prst="rect">
-            <a:avLst/>
-          </a:prstGeom>
-          <a:ln>
-            <a:noFill/>
-          </a:ln>
-        </p:spPr>
-        <p:style>
-          <a:lnRef idx="2">
-            <a:schemeClr val="accent6">
-              <a:shade val="50000"/>
-            </a:schemeClr>
-          </a:lnRef>
-          <a:fillRef idx="1001">
-            <a:schemeClr val="lt1"/>
-          </a:fillRef>
-          <a:effectRef idx="0">
-            <a:schemeClr val="accent6"/>
-          </a:effectRef>
-          <a:fontRef idx="minor">
-            <a:schemeClr val="lt1"/>
-          </a:fontRef>
-        </p:style>
-        <p:txBody>
-          <a:bodyPr rtlCol="0" anchor="ctr"/>
-          <a:lstStyle/>
-          <a:p>
-            <a:pPr algn="ctr"/>
-            <a:endParaRPr lang="en-US"/>
-          </a:p>
-        </p:txBody>
-      </p:sp>
       <p:sp>
         <p:nvSpPr>
           <p:cNvPr id="2" name="Title 1">
@@ -7334,12 +7880,7 @@
             <p:ph type="title"/>
           </p:nvPr>
         </p:nvSpPr>
-        <p:spPr>
-          <a:xfrm>
-            <a:off x="990932" y="286603"/>
-            <a:ext cx="6750987" cy="1450757"/>
-          </a:xfrm>
-        </p:spPr>
+        <p:spPr/>
         <p:txBody>
           <a:bodyPr>
             <a:normAutofit/>
@@ -7380,13 +7921,13 @@
         </p:nvSpPr>
         <p:spPr>
           <a:xfrm>
-            <a:off x="1044204" y="2023962"/>
-            <a:ext cx="6697715" cy="3845131"/>
+            <a:off x="1097280" y="1845734"/>
+            <a:ext cx="10058400" cy="4172410"/>
           </a:xfrm>
         </p:spPr>
         <p:txBody>
           <a:bodyPr>
-            <a:normAutofit/>
+            <a:normAutofit fontScale="92500"/>
           </a:bodyPr>
           <a:lstStyle/>
           <a:p>
@@ -7396,8 +7937,8 @@
               </a:lnSpc>
             </a:pPr>
             <a:r>
-              <a:rPr lang="en-PH" dirty="0"/>
-              <a:t>Model peer-to-peer learning inside the classroom</a:t>
+              <a:rPr lang="en-PH" sz="3200" dirty="0"/>
+              <a:t>Model peer-to-peer learning dynamics inside the classroom</a:t>
             </a:r>
           </a:p>
           <a:p>
@@ -7407,8 +7948,8 @@
               </a:lnSpc>
             </a:pPr>
             <a:r>
-              <a:rPr lang="en-PH" dirty="0"/>
-              <a:t>Investigate how the following affects the learning dynamics in a classroom:</a:t>
+              <a:rPr lang="en-PH" sz="3200" dirty="0"/>
+              <a:t>Investigate factors affecting the dynamics:</a:t>
             </a:r>
           </a:p>
           <a:p>
@@ -7418,7 +7959,7 @@
               </a:lnSpc>
             </a:pPr>
             <a:r>
-              <a:rPr lang="en-PH" sz="2000" dirty="0"/>
+              <a:rPr lang="en-PH" sz="2800" dirty="0"/>
               <a:t>Student aptitude level</a:t>
             </a:r>
           </a:p>
@@ -7429,7 +7970,7 @@
               </a:lnSpc>
             </a:pPr>
             <a:r>
-              <a:rPr lang="en-PH" sz="2000" dirty="0"/>
+              <a:rPr lang="en-PH" sz="2800" dirty="0"/>
               <a:t>Seating arrangement (with respect to student aptitude)</a:t>
             </a:r>
           </a:p>
@@ -7440,133 +7981,9 @@
               </a:lnSpc>
             </a:pPr>
             <a:r>
-              <a:rPr lang="en-PH" sz="2000" dirty="0"/>
+              <a:rPr lang="en-PH" sz="2800" dirty="0"/>
               <a:t>Aptitude homogeneity</a:t>
             </a:r>
-          </a:p>
-        </p:txBody>
-      </p:sp>
-      <p:sp>
-        <p:nvSpPr>
-          <p:cNvPr id="10" name="Rectangle 9">
-            <a:extLst>
-              <a:ext uri="{FF2B5EF4-FFF2-40B4-BE49-F238E27FC236}">
-                <a16:creationId xmlns:a16="http://schemas.microsoft.com/office/drawing/2014/main" id="{717A211C-5863-4303-AC3D-AEBFDF6D6A4C}"/>
-              </a:ext>
-              <a:ext uri="{C183D7F6-B498-43B3-948B-1728B52AA6E4}">
-                <adec:decorative xmlns:adec="http://schemas.microsoft.com/office/drawing/2017/decorative" val="1"/>
-              </a:ext>
-            </a:extLst>
-          </p:cNvPr>
-          <p:cNvSpPr>
-            <a:spLocks noGrp="1" noRot="1" noChangeAspect="1" noMove="1" noResize="1" noEditPoints="1" noAdjustHandles="1" noChangeArrowheads="1" noChangeShapeType="1" noTextEdit="1"/>
-          </p:cNvSpPr>
-          <p:nvPr>
-            <p:extLst>
-              <p:ext uri="{386F3935-93C4-4BCD-93E2-E3B085C9AB24}">
-                <p16:designElem xmlns:p16="http://schemas.microsoft.com/office/powerpoint/2015/main" val="1"/>
-              </p:ext>
-            </p:extLst>
-          </p:nvPr>
-        </p:nvSpPr>
-        <p:spPr>
-          <a:xfrm>
-            <a:off x="8144150" y="0"/>
-            <a:ext cx="4050791" cy="6858000"/>
-          </a:xfrm>
-          <a:prstGeom prst="rect">
-            <a:avLst/>
-          </a:prstGeom>
-          <a:solidFill>
-            <a:schemeClr val="accent2"/>
-          </a:solidFill>
-          <a:ln>
-            <a:noFill/>
-          </a:ln>
-        </p:spPr>
-        <p:style>
-          <a:lnRef idx="2">
-            <a:schemeClr val="accent1">
-              <a:shade val="50000"/>
-            </a:schemeClr>
-          </a:lnRef>
-          <a:fillRef idx="1">
-            <a:schemeClr val="accent1"/>
-          </a:fillRef>
-          <a:effectRef idx="0">
-            <a:schemeClr val="accent1"/>
-          </a:effectRef>
-          <a:fontRef idx="minor">
-            <a:schemeClr val="lt1"/>
-          </a:fontRef>
-        </p:style>
-        <p:txBody>
-          <a:bodyPr/>
-          <a:lstStyle/>
-          <a:p>
-            <a:endParaRPr lang="en-PH"/>
-          </a:p>
-        </p:txBody>
-      </p:sp>
-      <p:sp>
-        <p:nvSpPr>
-          <p:cNvPr id="12" name="Rectangle 11">
-            <a:extLst>
-              <a:ext uri="{FF2B5EF4-FFF2-40B4-BE49-F238E27FC236}">
-                <a16:creationId xmlns:a16="http://schemas.microsoft.com/office/drawing/2014/main" id="{087519CD-2FFF-42E3-BB0C-FEAA828BA5DB}"/>
-              </a:ext>
-              <a:ext uri="{C183D7F6-B498-43B3-948B-1728B52AA6E4}">
-                <adec:decorative xmlns:adec="http://schemas.microsoft.com/office/drawing/2017/decorative" val="1"/>
-              </a:ext>
-            </a:extLst>
-          </p:cNvPr>
-          <p:cNvSpPr>
-            <a:spLocks noGrp="1" noRot="1" noChangeAspect="1" noMove="1" noResize="1" noEditPoints="1" noAdjustHandles="1" noChangeArrowheads="1" noChangeShapeType="1" noTextEdit="1"/>
-          </p:cNvSpPr>
-          <p:nvPr>
-            <p:extLst>
-              <p:ext uri="{386F3935-93C4-4BCD-93E2-E3B085C9AB24}">
-                <p16:designElem xmlns:p16="http://schemas.microsoft.com/office/powerpoint/2015/main" val="1"/>
-              </p:ext>
-            </p:extLst>
-          </p:nvPr>
-        </p:nvSpPr>
-        <p:spPr>
-          <a:xfrm>
-            <a:off x="8132823" y="0"/>
-            <a:ext cx="64008" cy="6858000"/>
-          </a:xfrm>
-          <a:prstGeom prst="rect">
-            <a:avLst/>
-          </a:prstGeom>
-          <a:solidFill>
-            <a:schemeClr val="accent1"/>
-          </a:solidFill>
-          <a:ln>
-            <a:noFill/>
-          </a:ln>
-        </p:spPr>
-        <p:style>
-          <a:lnRef idx="2">
-            <a:schemeClr val="accent1">
-              <a:shade val="50000"/>
-            </a:schemeClr>
-          </a:lnRef>
-          <a:fillRef idx="1">
-            <a:schemeClr val="accent1"/>
-          </a:fillRef>
-          <a:effectRef idx="0">
-            <a:schemeClr val="accent1"/>
-          </a:effectRef>
-          <a:fontRef idx="minor">
-            <a:schemeClr val="lt1"/>
-          </a:fontRef>
-        </p:style>
-        <p:txBody>
-          <a:bodyPr/>
-          <a:lstStyle/>
-          <a:p>
-            <a:endParaRPr lang="en-PH"/>
           </a:p>
         </p:txBody>
       </p:sp>
@@ -7715,29 +8132,16 @@
         </p:spPr>
         <p:txBody>
           <a:bodyPr numCol="2">
-            <a:normAutofit lnSpcReduction="10000"/>
+            <a:normAutofit/>
           </a:bodyPr>
           <a:lstStyle/>
           <a:p>
-            <a:pPr lvl="1"/>
+            <a:pPr marL="201168" lvl="1" indent="0">
+              <a:buNone/>
+            </a:pPr>
             <a:r>
               <a:rPr lang="en-PH" dirty="0"/>
-              <a:t>Uses a neural network to predict the outcome of the classroom based on the initial seating arrangement and aptitude levels of the students</a:t>
-            </a:r>
-          </a:p>
-          <a:p>
-            <a:pPr lvl="1"/>
-            <a:endParaRPr lang="en-PH" dirty="0"/>
-          </a:p>
-          <a:p>
-            <a:pPr lvl="1"/>
-            <a:endParaRPr lang="en-PH" dirty="0"/>
-          </a:p>
-          <a:p>
-            <a:pPr lvl="1"/>
-            <a:r>
-              <a:rPr lang="en-PH" dirty="0"/>
-              <a:t>Findings:</a:t>
+              <a:t>Main findings:</a:t>
             </a:r>
           </a:p>
           <a:p>
@@ -7771,15 +8175,75 @@
           <p:nvPr/>
         </p:nvPicPr>
         <p:blipFill>
-          <a:blip r:embed="rId2"/>
+          <a:blip r:embed="rId3"/>
           <a:stretch>
             <a:fillRect/>
           </a:stretch>
         </p:blipFill>
         <p:spPr>
           <a:xfrm>
-            <a:off x="942225" y="1240986"/>
-            <a:ext cx="10368506" cy="2090028"/>
+            <a:off x="1632995" y="1132453"/>
+            <a:ext cx="8688792" cy="1751440"/>
+          </a:xfrm>
+          <a:prstGeom prst="rect">
+            <a:avLst/>
+          </a:prstGeom>
+        </p:spPr>
+      </p:pic>
+      <p:pic>
+        <p:nvPicPr>
+          <p:cNvPr id="18" name="Picture 17">
+            <a:extLst>
+              <a:ext uri="{FF2B5EF4-FFF2-40B4-BE49-F238E27FC236}">
+                <a16:creationId xmlns:a16="http://schemas.microsoft.com/office/drawing/2014/main" id="{21D1F722-3646-D40B-5E25-0D34C9308EDE}"/>
+              </a:ext>
+            </a:extLst>
+          </p:cNvPr>
+          <p:cNvPicPr>
+            <a:picLocks noChangeAspect="1"/>
+          </p:cNvPicPr>
+          <p:nvPr/>
+        </p:nvPicPr>
+        <p:blipFill>
+          <a:blip r:embed="rId4"/>
+          <a:stretch>
+            <a:fillRect/>
+          </a:stretch>
+        </p:blipFill>
+        <p:spPr>
+          <a:xfrm>
+            <a:off x="7364408" y="3372321"/>
+            <a:ext cx="3730313" cy="2198561"/>
+          </a:xfrm>
+          <a:prstGeom prst="rect">
+            <a:avLst/>
+          </a:prstGeom>
+        </p:spPr>
+      </p:pic>
+      <p:pic>
+        <p:nvPicPr>
+          <p:cNvPr id="5" name="Picture 4">
+            <a:extLst>
+              <a:ext uri="{FF2B5EF4-FFF2-40B4-BE49-F238E27FC236}">
+                <a16:creationId xmlns:a16="http://schemas.microsoft.com/office/drawing/2014/main" id="{4B18FAFA-AC7E-88E4-D987-5AFABE5D4AF1}"/>
+              </a:ext>
+            </a:extLst>
+          </p:cNvPr>
+          <p:cNvPicPr>
+            <a:picLocks noChangeAspect="1"/>
+          </p:cNvPicPr>
+          <p:nvPr/>
+        </p:nvPicPr>
+        <p:blipFill>
+          <a:blip r:embed="rId5"/>
+          <a:stretch>
+            <a:fillRect/>
+          </a:stretch>
+        </p:blipFill>
+        <p:spPr>
+          <a:xfrm>
+            <a:off x="3535606" y="2738871"/>
+            <a:ext cx="4883570" cy="670481"/>
           </a:xfrm>
           <a:prstGeom prst="rect">
             <a:avLst/>
@@ -7789,7 +8253,7 @@
     </p:spTree>
     <p:extLst>
       <p:ext uri="{BB962C8B-B14F-4D97-AF65-F5344CB8AC3E}">
-        <p14:creationId xmlns:p14="http://schemas.microsoft.com/office/powerpoint/2010/main" val="2462673203"/>
+        <p14:creationId xmlns:p14="http://schemas.microsoft.com/office/powerpoint/2010/main" val="1276212751"/>
       </p:ext>
     </p:extLst>
   </p:cSld>
@@ -7824,128 +8288,6 @@
           <a:chExt cx="0" cy="0"/>
         </a:xfrm>
       </p:grpSpPr>
-      <p:sp useBgFill="1">
-        <p:nvSpPr>
-          <p:cNvPr id="10" name="Rectangle 9">
-            <a:extLst>
-              <a:ext uri="{FF2B5EF4-FFF2-40B4-BE49-F238E27FC236}">
-                <a16:creationId xmlns:a16="http://schemas.microsoft.com/office/drawing/2014/main" id="{EE1530B0-6F96-46C0-8B3E-3215CB756BE4}"/>
-              </a:ext>
-              <a:ext uri="{C183D7F6-B498-43B3-948B-1728B52AA6E4}">
-                <adec:decorative xmlns:adec="http://schemas.microsoft.com/office/drawing/2017/decorative" val="1"/>
-              </a:ext>
-            </a:extLst>
-          </p:cNvPr>
-          <p:cNvSpPr>
-            <a:spLocks noGrp="1" noRot="1" noChangeAspect="1" noMove="1" noResize="1" noEditPoints="1" noAdjustHandles="1" noChangeArrowheads="1" noChangeShapeType="1" noTextEdit="1"/>
-          </p:cNvSpPr>
-          <p:nvPr>
-            <p:extLst>
-              <p:ext uri="{386F3935-93C4-4BCD-93E2-E3B085C9AB24}">
-                <p16:designElem xmlns:p16="http://schemas.microsoft.com/office/powerpoint/2015/main" val="1"/>
-              </p:ext>
-            </p:extLst>
-          </p:nvPr>
-        </p:nvSpPr>
-        <p:spPr>
-          <a:xfrm>
-            <a:off x="5685" y="0"/>
-            <a:ext cx="12186315" cy="6858000"/>
-          </a:xfrm>
-          <a:prstGeom prst="rect">
-            <a:avLst/>
-          </a:prstGeom>
-          <a:ln>
-            <a:noFill/>
-          </a:ln>
-        </p:spPr>
-        <p:style>
-          <a:lnRef idx="2">
-            <a:schemeClr val="accent6">
-              <a:shade val="50000"/>
-            </a:schemeClr>
-          </a:lnRef>
-          <a:fillRef idx="1001">
-            <a:schemeClr val="lt1"/>
-          </a:fillRef>
-          <a:effectRef idx="0">
-            <a:schemeClr val="accent6"/>
-          </a:effectRef>
-          <a:fontRef idx="minor">
-            <a:schemeClr val="lt1"/>
-          </a:fontRef>
-        </p:style>
-        <p:txBody>
-          <a:bodyPr rtlCol="0" anchor="ctr"/>
-          <a:lstStyle/>
-          <a:p>
-            <a:pPr algn="ctr"/>
-            <a:endParaRPr lang="en-US"/>
-          </a:p>
-        </p:txBody>
-      </p:sp>
-      <p:sp>
-        <p:nvSpPr>
-          <p:cNvPr id="12" name="Rectangle 11">
-            <a:extLst>
-              <a:ext uri="{FF2B5EF4-FFF2-40B4-BE49-F238E27FC236}">
-                <a16:creationId xmlns:a16="http://schemas.microsoft.com/office/drawing/2014/main" id="{754910CF-1B56-45D3-960A-E89F7B3B9131}"/>
-              </a:ext>
-              <a:ext uri="{C183D7F6-B498-43B3-948B-1728B52AA6E4}">
-                <adec:decorative xmlns:adec="http://schemas.microsoft.com/office/drawing/2017/decorative" val="1"/>
-              </a:ext>
-            </a:extLst>
-          </p:cNvPr>
-          <p:cNvSpPr>
-            <a:spLocks noGrp="1" noRot="1" noChangeAspect="1" noMove="1" noResize="1" noEditPoints="1" noAdjustHandles="1" noChangeArrowheads="1" noChangeShapeType="1" noTextEdit="1"/>
-          </p:cNvSpPr>
-          <p:nvPr>
-            <p:extLst>
-              <p:ext uri="{386F3935-93C4-4BCD-93E2-E3B085C9AB24}">
-                <p16:designElem xmlns:p16="http://schemas.microsoft.com/office/powerpoint/2015/main" val="1"/>
-              </p:ext>
-            </p:extLst>
-          </p:nvPr>
-        </p:nvSpPr>
-        <p:spPr>
-          <a:xfrm>
-            <a:off x="16" y="0"/>
-            <a:ext cx="4050791" cy="6858000"/>
-          </a:xfrm>
-          <a:prstGeom prst="rect">
-            <a:avLst/>
-          </a:prstGeom>
-          <a:solidFill>
-            <a:schemeClr val="accent2"/>
-          </a:solidFill>
-          <a:ln>
-            <a:noFill/>
-          </a:ln>
-        </p:spPr>
-        <p:style>
-          <a:lnRef idx="2">
-            <a:schemeClr val="accent1">
-              <a:shade val="50000"/>
-            </a:schemeClr>
-          </a:lnRef>
-          <a:fillRef idx="1">
-            <a:schemeClr val="accent1"/>
-          </a:fillRef>
-          <a:effectRef idx="0">
-            <a:schemeClr val="accent1"/>
-          </a:effectRef>
-          <a:fontRef idx="minor">
-            <a:schemeClr val="lt1"/>
-          </a:fontRef>
-        </p:style>
-        <p:txBody>
-          <a:bodyPr/>
-          <a:lstStyle/>
-          <a:p>
-            <a:endParaRPr lang="en-PH"/>
-          </a:p>
-        </p:txBody>
-      </p:sp>
       <p:sp>
         <p:nvSpPr>
           <p:cNvPr id="2" name="Title 1">
@@ -7964,86 +8306,20 @@
         </p:nvSpPr>
         <p:spPr>
           <a:xfrm>
-            <a:off x="492370" y="516835"/>
-            <a:ext cx="3084844" cy="5772840"/>
+            <a:off x="1097280" y="286603"/>
+            <a:ext cx="10058400" cy="1450757"/>
           </a:xfrm>
         </p:spPr>
         <p:txBody>
-          <a:bodyPr anchor="ctr">
+          <a:bodyPr>
             <a:normAutofit/>
           </a:bodyPr>
           <a:lstStyle/>
           <a:p>
             <a:r>
-              <a:rPr lang="en-PH" sz="3600">
-                <a:solidFill>
-                  <a:srgbClr val="FFFFFF"/>
-                </a:solidFill>
-              </a:rPr>
-              <a:t>System Observables:</a:t>
+              <a:rPr lang="en-PH" dirty="0"/>
+              <a:t>Research questions:</a:t>
             </a:r>
-          </a:p>
-        </p:txBody>
-      </p:sp>
-      <p:sp>
-        <p:nvSpPr>
-          <p:cNvPr id="14" name="Rectangle 13">
-            <a:extLst>
-              <a:ext uri="{FF2B5EF4-FFF2-40B4-BE49-F238E27FC236}">
-                <a16:creationId xmlns:a16="http://schemas.microsoft.com/office/drawing/2014/main" id="{6669F804-A677-4B75-95F4-A5E4426FB774}"/>
-              </a:ext>
-              <a:ext uri="{C183D7F6-B498-43B3-948B-1728B52AA6E4}">
-                <adec:decorative xmlns:adec="http://schemas.microsoft.com/office/drawing/2017/decorative" val="1"/>
-              </a:ext>
-            </a:extLst>
-          </p:cNvPr>
-          <p:cNvSpPr>
-            <a:spLocks noGrp="1" noRot="1" noChangeAspect="1" noMove="1" noResize="1" noEditPoints="1" noAdjustHandles="1" noChangeArrowheads="1" noChangeShapeType="1" noTextEdit="1"/>
-          </p:cNvSpPr>
-          <p:nvPr>
-            <p:extLst>
-              <p:ext uri="{386F3935-93C4-4BCD-93E2-E3B085C9AB24}">
-                <p16:designElem xmlns:p16="http://schemas.microsoft.com/office/powerpoint/2015/main" val="1"/>
-              </p:ext>
-            </p:extLst>
-          </p:nvPr>
-        </p:nvSpPr>
-        <p:spPr>
-          <a:xfrm>
-            <a:off x="4040071" y="0"/>
-            <a:ext cx="64008" cy="6858000"/>
-          </a:xfrm>
-          <a:prstGeom prst="rect">
-            <a:avLst/>
-          </a:prstGeom>
-          <a:solidFill>
-            <a:schemeClr val="accent1"/>
-          </a:solidFill>
-          <a:ln>
-            <a:noFill/>
-          </a:ln>
-        </p:spPr>
-        <p:style>
-          <a:lnRef idx="2">
-            <a:schemeClr val="accent1">
-              <a:shade val="50000"/>
-            </a:schemeClr>
-          </a:lnRef>
-          <a:fillRef idx="1">
-            <a:schemeClr val="accent1"/>
-          </a:fillRef>
-          <a:effectRef idx="0">
-            <a:schemeClr val="accent1"/>
-          </a:effectRef>
-          <a:fontRef idx="minor">
-            <a:schemeClr val="lt1"/>
-          </a:fontRef>
-        </p:style>
-        <p:txBody>
-          <a:bodyPr/>
-          <a:lstStyle/>
-          <a:p>
-            <a:endParaRPr lang="en-PH"/>
           </a:p>
         </p:txBody>
       </p:sp>
@@ -8065,8 +8341,8 @@
         </p:nvSpPr>
         <p:spPr>
           <a:xfrm>
-            <a:off x="10123055" y="6459785"/>
-            <a:ext cx="1089428" cy="365125"/>
+            <a:off x="9900458" y="6459785"/>
+            <a:ext cx="1312025" cy="365125"/>
           </a:xfrm>
         </p:spPr>
         <p:txBody>
@@ -8084,11 +8360,7 @@
               </a:spcAft>
             </a:pPr>
             <a:fld id="{367A0FFC-85A0-44D4-AF3C-BA7A79D4CEC3}" type="slidenum">
-              <a:rPr lang="en-PH" sz="1900">
-                <a:solidFill>
-                  <a:schemeClr val="tx2"/>
-                </a:solidFill>
-              </a:rPr>
+              <a:rPr lang="en-PH" sz="1900"/>
               <a:pPr>
                 <a:lnSpc>
                   <a:spcPct val="90000"/>
@@ -8099,11 +8371,7 @@
               </a:pPr>
               <a:t>4</a:t>
             </a:fld>
-            <a:endParaRPr lang="en-PH" sz="1900">
-              <a:solidFill>
-                <a:schemeClr val="tx2"/>
-              </a:solidFill>
-            </a:endParaRPr>
+            <a:endParaRPr lang="en-PH" sz="1900"/>
           </a:p>
         </p:txBody>
       </p:sp>
@@ -8123,18 +8391,18 @@
             <p:ph idx="1"/>
             <p:extLst>
               <p:ext uri="{D42A27DB-BD31-4B8C-83A1-F6EECF244321}">
-                <p14:modId xmlns:p14="http://schemas.microsoft.com/office/powerpoint/2010/main" val="4286941281"/>
+                <p14:modId xmlns:p14="http://schemas.microsoft.com/office/powerpoint/2010/main" val="3182733269"/>
               </p:ext>
             </p:extLst>
           </p:nvPr>
         </p:nvGraphicFramePr>
         <p:xfrm>
-          <a:off x="4741863" y="639763"/>
-          <a:ext cx="6797675" cy="5649912"/>
+          <a:off x="1096963" y="2098515"/>
+          <a:ext cx="10058400" cy="3786080"/>
         </p:xfrm>
         <a:graphic>
           <a:graphicData uri="http://schemas.openxmlformats.org/drawingml/2006/diagram">
-            <dgm:relIds xmlns:dgm="http://schemas.openxmlformats.org/drawingml/2006/diagram" xmlns:r="http://schemas.openxmlformats.org/officeDocument/2006/relationships" r:dm="rId2" r:lo="rId3" r:qs="rId4" r:cs="rId5"/>
+            <dgm:relIds xmlns:dgm="http://schemas.openxmlformats.org/drawingml/2006/diagram" xmlns:r="http://schemas.openxmlformats.org/officeDocument/2006/relationships" r:dm="rId3" r:lo="rId4" r:qs="rId5" r:cs="rId6"/>
           </a:graphicData>
         </a:graphic>
       </p:graphicFrame>
@@ -8191,7 +8459,7 @@
           <a:p>
             <a:r>
               <a:rPr lang="en-PH" dirty="0"/>
-              <a:t>2D Binary Probabilistic Cellular Automata Model</a:t>
+              <a:t>2D Binary Probabilistic CA Model</a:t>
             </a:r>
           </a:p>
         </p:txBody>
@@ -8226,165 +8494,15 @@
                     <a:spcPct val="170000"/>
                   </a:lnSpc>
                 </a:pPr>
-                <a:r>
-                  <a:rPr lang="en-PH" sz="2400" dirty="0"/>
-                  <a:t>Each student belongs to a 3x3 neighborhood </a:t>
-                </a:r>
-                <a14:m>
-                  <m:oMath xmlns:m="http://schemas.openxmlformats.org/officeDocument/2006/math">
-                    <m:r>
-                      <a:rPr lang="en-PH" sz="2400" b="0" i="1" smtClean="0">
-                        <a:latin typeface="Cambria Math" panose="02040503050406030204" pitchFamily="18" charset="0"/>
-                      </a:rPr>
-                      <m:t>𝑁</m:t>
-                    </m:r>
-                  </m:oMath>
-                </a14:m>
-                <a:r>
-                  <a:rPr lang="en-PH" sz="2400" dirty="0"/>
-                  <a:t> (Moore neighborhood) with a </a:t>
-                </a:r>
-                <a14:m>
-                  <m:oMath xmlns:m="http://schemas.openxmlformats.org/officeDocument/2006/math">
-                    <m:sSub>
-                      <m:sSubPr>
-                        <m:ctrlPr>
-                          <a:rPr lang="en-PH" sz="2400" b="0" i="1" smtClean="0">
-                            <a:latin typeface="Cambria Math" panose="02040503050406030204" pitchFamily="18" charset="0"/>
-                          </a:rPr>
-                        </m:ctrlPr>
-                      </m:sSubPr>
-                      <m:e>
-                        <m:r>
-                          <a:rPr lang="en-PH" sz="2400" b="0" i="1" smtClean="0">
-                            <a:latin typeface="Cambria Math" panose="02040503050406030204" pitchFamily="18" charset="0"/>
-                          </a:rPr>
-                          <m:t>𝜆</m:t>
-                        </m:r>
-                      </m:e>
-                      <m:sub>
-                        <m:r>
-                          <a:rPr lang="en-PH" sz="2400" b="0" i="1" smtClean="0">
-                            <a:latin typeface="Cambria Math" panose="02040503050406030204" pitchFamily="18" charset="0"/>
-                          </a:rPr>
-                          <m:t>𝑖</m:t>
-                        </m:r>
-                      </m:sub>
-                    </m:sSub>
-                  </m:oMath>
-                </a14:m>
-                <a:r>
-                  <a:rPr lang="en-PH" sz="2400" dirty="0"/>
-                  <a:t> chance from learning from their neighbors </a:t>
-                </a:r>
-                <a14:m>
-                  <m:oMath xmlns:m="http://schemas.openxmlformats.org/officeDocument/2006/math">
-                    <m:sSub>
-                      <m:sSubPr>
-                        <m:ctrlPr>
-                          <a:rPr lang="en-PH" sz="2400" b="0" i="1" smtClean="0">
-                            <a:latin typeface="Cambria Math" panose="02040503050406030204" pitchFamily="18" charset="0"/>
-                          </a:rPr>
-                        </m:ctrlPr>
-                      </m:sSubPr>
-                      <m:e>
-                        <m:r>
-                          <a:rPr lang="en-PH" sz="2400" b="0" i="1" smtClean="0">
-                            <a:latin typeface="Cambria Math" panose="02040503050406030204" pitchFamily="18" charset="0"/>
-                          </a:rPr>
-                          <m:t>𝑛</m:t>
-                        </m:r>
-                      </m:e>
-                      <m:sub>
-                        <m:r>
-                          <a:rPr lang="en-PH" sz="2400" b="0" i="1" smtClean="0">
-                            <a:latin typeface="Cambria Math" panose="02040503050406030204" pitchFamily="18" charset="0"/>
-                          </a:rPr>
-                          <m:t>𝑖</m:t>
-                        </m:r>
-                      </m:sub>
-                    </m:sSub>
-                  </m:oMath>
-                </a14:m>
-                <a:r>
-                  <a:rPr lang="en-PH" sz="2400" b="0" dirty="0"/>
-                  <a:t> with state </a:t>
-                </a:r>
-                <a14:m>
-                  <m:oMath xmlns:m="http://schemas.openxmlformats.org/officeDocument/2006/math">
-                    <m:sSub>
-                      <m:sSubPr>
-                        <m:ctrlPr>
-                          <a:rPr lang="en-PH" sz="2400" b="0" i="1" smtClean="0">
-                            <a:latin typeface="Cambria Math" panose="02040503050406030204" pitchFamily="18" charset="0"/>
-                          </a:rPr>
-                        </m:ctrlPr>
-                      </m:sSubPr>
-                      <m:e>
-                        <m:r>
-                          <a:rPr lang="en-PH" sz="2400" b="0" i="1" smtClean="0">
-                            <a:latin typeface="Cambria Math" panose="02040503050406030204" pitchFamily="18" charset="0"/>
-                          </a:rPr>
-                          <m:t>𝑆</m:t>
-                        </m:r>
-                      </m:e>
-                      <m:sub>
-                        <m:r>
-                          <a:rPr lang="en-PH" sz="2400" b="0" i="1" smtClean="0">
-                            <a:latin typeface="Cambria Math" panose="02040503050406030204" pitchFamily="18" charset="0"/>
-                          </a:rPr>
-                          <m:t>𝑖</m:t>
-                        </m:r>
-                      </m:sub>
-                    </m:sSub>
-                  </m:oMath>
-                </a14:m>
-                <a:endParaRPr lang="en-PH" sz="2400" b="0" dirty="0"/>
+                <a:endParaRPr lang="en-PH" sz="2400" dirty="0"/>
               </a:p>
               <a:p>
-                <a:pPr lvl="1">
+                <a:pPr>
                   <a:lnSpc>
                     <a:spcPct val="170000"/>
                   </a:lnSpc>
                 </a:pPr>
-                <a:r>
-                  <a:rPr lang="en-PH" sz="2000" dirty="0"/>
-                  <a:t>Note: student of interest is set to be the center of the neighborhood (</a:t>
-                </a:r>
-                <a14:m>
-                  <m:oMath xmlns:m="http://schemas.openxmlformats.org/officeDocument/2006/math">
-                    <m:sSub>
-                      <m:sSubPr>
-                        <m:ctrlPr>
-                          <a:rPr lang="en-PH" sz="2000" b="0" i="1" smtClean="0">
-                            <a:latin typeface="Cambria Math" panose="02040503050406030204" pitchFamily="18" charset="0"/>
-                          </a:rPr>
-                        </m:ctrlPr>
-                      </m:sSubPr>
-                      <m:e>
-                        <m:r>
-                          <a:rPr lang="en-PH" sz="2000" b="0" i="1" smtClean="0">
-                            <a:latin typeface="Cambria Math" panose="02040503050406030204" pitchFamily="18" charset="0"/>
-                          </a:rPr>
-                          <m:t>𝑛</m:t>
-                        </m:r>
-                      </m:e>
-                      <m:sub>
-                        <m:r>
-                          <a:rPr lang="en-PH" sz="2000" b="0" i="1" smtClean="0">
-                            <a:latin typeface="Cambria Math" panose="02040503050406030204" pitchFamily="18" charset="0"/>
-                          </a:rPr>
-                          <m:t>5</m:t>
-                        </m:r>
-                      </m:sub>
-                    </m:sSub>
-                  </m:oMath>
-                </a14:m>
-                <a:r>
-                  <a:rPr lang="en-PH" sz="2000" b="0" dirty="0"/>
-                  <a:t>)</a:t>
-                </a:r>
-                <a:endParaRPr lang="en-PH" dirty="0"/>
+                <a:endParaRPr lang="en-PH" sz="2400" dirty="0"/>
               </a:p>
               <a:p>
                 <a:pPr>
@@ -8394,7 +8512,7 @@
                 </a:pPr>
                 <a:r>
                   <a:rPr lang="en-PH" sz="2400" dirty="0"/>
-                  <a:t>Each student has a chance of learning based on the following equation:</a:t>
+                  <a:t>Learning probability</a:t>
                 </a:r>
               </a:p>
               <a:p>
@@ -8563,9 +8681,9 @@
             </p:nvSpPr>
             <p:spPr>
               <a:blipFill>
-                <a:blip r:embed="rId2"/>
+                <a:blip r:embed="rId4"/>
                 <a:stretch>
-                  <a:fillRect l="-909" b="-4697"/>
+                  <a:fillRect l="-909"/>
                 </a:stretch>
               </a:blipFill>
             </p:spPr>
@@ -8630,13 +8748,13 @@
               <p:nvPr>
                 <p:extLst>
                   <p:ext uri="{D42A27DB-BD31-4B8C-83A1-F6EECF244321}">
-                    <p14:modId xmlns:p14="http://schemas.microsoft.com/office/powerpoint/2010/main" val="359506125"/>
+                    <p14:modId xmlns:p14="http://schemas.microsoft.com/office/powerpoint/2010/main" val="2786394701"/>
                   </p:ext>
                 </p:extLst>
               </p:nvPr>
             </p:nvGraphicFramePr>
             <p:xfrm>
-              <a:off x="9414111" y="2470460"/>
+              <a:off x="1437959" y="1953625"/>
               <a:ext cx="1544949" cy="1544949"/>
             </p:xfrm>
             <a:graphic>
@@ -9115,13 +9233,13 @@
               <p:nvPr>
                 <p:extLst>
                   <p:ext uri="{D42A27DB-BD31-4B8C-83A1-F6EECF244321}">
-                    <p14:modId xmlns:p14="http://schemas.microsoft.com/office/powerpoint/2010/main" val="359506125"/>
+                    <p14:modId xmlns:p14="http://schemas.microsoft.com/office/powerpoint/2010/main" val="2786394701"/>
                   </p:ext>
                 </p:extLst>
               </p:nvPr>
             </p:nvGraphicFramePr>
             <p:xfrm>
-              <a:off x="9414111" y="2470460"/>
+              <a:off x="1437959" y="1953625"/>
               <a:ext cx="1544949" cy="1544949"/>
             </p:xfrm>
             <a:graphic>
@@ -9164,9 +9282,9 @@
                       </a:txBody>
                       <a:tcPr marL="98105" marR="98105" marT="49052" marB="49052" anchor="ctr">
                         <a:blipFill>
-                          <a:blip r:embed="rId3"/>
+                          <a:blip r:embed="rId5"/>
                           <a:stretch>
-                            <a:fillRect l="-1176" t="-1176" r="-201176" b="-201176"/>
+                            <a:fillRect l="-1176" t="-1176" r="-202353" b="-201176"/>
                           </a:stretch>
                         </a:blipFill>
                       </a:tcPr>
@@ -9181,9 +9299,9 @@
                       </a:txBody>
                       <a:tcPr marL="98105" marR="98105" marT="49052" marB="49052" anchor="ctr">
                         <a:blipFill>
-                          <a:blip r:embed="rId3"/>
+                          <a:blip r:embed="rId5"/>
                           <a:stretch>
-                            <a:fillRect l="-102381" t="-1176" r="-103571" b="-201176"/>
+                            <a:fillRect l="-101176" t="-1176" r="-102353" b="-201176"/>
                           </a:stretch>
                         </a:blipFill>
                       </a:tcPr>
@@ -9198,9 +9316,9 @@
                       </a:txBody>
                       <a:tcPr marL="98105" marR="98105" marT="49052" marB="49052" anchor="ctr">
                         <a:blipFill>
-                          <a:blip r:embed="rId3"/>
+                          <a:blip r:embed="rId5"/>
                           <a:stretch>
-                            <a:fillRect l="-200000" t="-1176" r="-2353" b="-201176"/>
+                            <a:fillRect l="-201176" t="-1176" r="-2353" b="-201176"/>
                           </a:stretch>
                         </a:blipFill>
                       </a:tcPr>
@@ -9222,9 +9340,9 @@
                       </a:txBody>
                       <a:tcPr marL="98105" marR="98105" marT="49052" marB="49052" anchor="ctr">
                         <a:blipFill>
-                          <a:blip r:embed="rId3"/>
+                          <a:blip r:embed="rId5"/>
                           <a:stretch>
-                            <a:fillRect l="-1176" t="-102381" r="-201176" b="-103571"/>
+                            <a:fillRect l="-1176" t="-102381" r="-202353" b="-103571"/>
                           </a:stretch>
                         </a:blipFill>
                       </a:tcPr>
@@ -9239,9 +9357,9 @@
                       </a:txBody>
                       <a:tcPr marL="98105" marR="98105" marT="49052" marB="49052" anchor="ctr">
                         <a:blipFill>
-                          <a:blip r:embed="rId3"/>
+                          <a:blip r:embed="rId5"/>
                           <a:stretch>
-                            <a:fillRect l="-102381" t="-102381" r="-103571" b="-103571"/>
+                            <a:fillRect l="-101176" t="-102381" r="-102353" b="-103571"/>
                           </a:stretch>
                         </a:blipFill>
                       </a:tcPr>
@@ -9256,9 +9374,9 @@
                       </a:txBody>
                       <a:tcPr marL="98105" marR="98105" marT="49052" marB="49052" anchor="ctr">
                         <a:blipFill>
-                          <a:blip r:embed="rId3"/>
+                          <a:blip r:embed="rId5"/>
                           <a:stretch>
-                            <a:fillRect l="-200000" t="-102381" r="-2353" b="-103571"/>
+                            <a:fillRect l="-201176" t="-102381" r="-2353" b="-103571"/>
                           </a:stretch>
                         </a:blipFill>
                       </a:tcPr>
@@ -9280,9 +9398,9 @@
                       </a:txBody>
                       <a:tcPr marL="98105" marR="98105" marT="49052" marB="49052" anchor="ctr">
                         <a:blipFill>
-                          <a:blip r:embed="rId3"/>
+                          <a:blip r:embed="rId5"/>
                           <a:stretch>
-                            <a:fillRect l="-1176" t="-200000" r="-201176" b="-2353"/>
+                            <a:fillRect l="-1176" t="-200000" r="-202353" b="-2353"/>
                           </a:stretch>
                         </a:blipFill>
                       </a:tcPr>
@@ -9297,9 +9415,9 @@
                       </a:txBody>
                       <a:tcPr marL="98105" marR="98105" marT="49052" marB="49052" anchor="ctr">
                         <a:blipFill>
-                          <a:blip r:embed="rId3"/>
+                          <a:blip r:embed="rId5"/>
                           <a:stretch>
-                            <a:fillRect l="-102381" t="-200000" r="-103571" b="-2353"/>
+                            <a:fillRect l="-101176" t="-200000" r="-102353" b="-2353"/>
                           </a:stretch>
                         </a:blipFill>
                       </a:tcPr>
@@ -9314,9 +9432,9 @@
                       </a:txBody>
                       <a:tcPr marL="98105" marR="98105" marT="49052" marB="49052" anchor="ctr">
                         <a:blipFill>
-                          <a:blip r:embed="rId3"/>
+                          <a:blip r:embed="rId5"/>
                           <a:stretch>
-                            <a:fillRect l="-200000" t="-200000" r="-2353" b="-2353"/>
+                            <a:fillRect l="-201176" t="-200000" r="-2353" b="-2353"/>
                           </a:stretch>
                         </a:blipFill>
                       </a:tcPr>
@@ -9343,6 +9461,11 @@
   <p:clrMapOvr>
     <a:masterClrMapping/>
   </p:clrMapOvr>
+  <p:extLst>
+    <p:ext uri="{6950BFC3-D8DA-4A85-94F7-54DA5524770B}">
+      <p188:commentRel xmlns:p188="http://schemas.microsoft.com/office/powerpoint/2018/8/main" r:id="rId3"/>
+    </p:ext>
+  </p:extLst>
 </p:sld>
 </file>
 
@@ -9386,7 +9509,7 @@
           <a:p>
             <a:r>
               <a:rPr lang="en-PH" dirty="0"/>
-              <a:t>2D Binary Probabilistic Cellular Automata Model</a:t>
+              <a:t>2D Binary Probabilistic CA Model</a:t>
             </a:r>
           </a:p>
         </p:txBody>
@@ -9764,7 +9887,7 @@
                 </a14:m>
                 <a:r>
                   <a:rPr lang="en-PH" sz="2400" dirty="0"/>
-                  <a:t>	is the state of the </a:t>
+                  <a:t>	: state of the </a:t>
                 </a:r>
                 <a:r>
                   <a:rPr lang="en-PH" sz="2400" dirty="0" err="1"/>
@@ -9801,7 +9924,7 @@
                 </a14:m>
                 <a:r>
                   <a:rPr lang="en-PH" sz="2400" dirty="0"/>
-                  <a:t> 	is a randomly generated number (uniform distribution [0,1])</a:t>
+                  <a:t> 	: randomly generated number (uniform distribution [0,1])</a:t>
                 </a:r>
               </a:p>
               <a:p>
@@ -9841,7 +9964,7 @@
                 </a14:m>
                 <a:r>
                   <a:rPr lang="en-PH" sz="2400" dirty="0"/>
-                  <a:t>	is the probability the </a:t>
+                  <a:t>	: probability the </a:t>
                 </a:r>
                 <a:r>
                   <a:rPr lang="en-PH" sz="2400" dirty="0" err="1"/>
@@ -9884,7 +10007,7 @@
               <a:blipFill>
                 <a:blip r:embed="rId2"/>
                 <a:stretch>
-                  <a:fillRect l="-1818" r="-1939" b="-13485"/>
+                  <a:fillRect l="-1818" b="-13485"/>
                 </a:stretch>
               </a:blipFill>
             </p:spPr>

</xml_diff>